<commit_message>
Made some small changes to MLLib slides.
</commit_message>
<xml_diff>
--- a/slides/MLLib.pptx
+++ b/slides/MLLib.pptx
@@ -5,10 +5,10 @@
     <p:sldMasterId id="2147483672" r:id="rId1"/>
   </p:sldMasterIdLst>
   <p:notesMasterIdLst>
-    <p:notesMasterId r:id="rId38"/>
+    <p:notesMasterId r:id="rId41"/>
   </p:notesMasterIdLst>
   <p:handoutMasterIdLst>
-    <p:handoutMasterId r:id="rId39"/>
+    <p:handoutMasterId r:id="rId42"/>
   </p:handoutMasterIdLst>
   <p:sldIdLst>
     <p:sldId id="258" r:id="rId2"/>
@@ -18,35 +18,38 @@
     <p:sldId id="359" r:id="rId6"/>
     <p:sldId id="366" r:id="rId7"/>
     <p:sldId id="368" r:id="rId8"/>
-    <p:sldId id="367" r:id="rId9"/>
-    <p:sldId id="337" r:id="rId10"/>
-    <p:sldId id="338" r:id="rId11"/>
-    <p:sldId id="339" r:id="rId12"/>
-    <p:sldId id="340" r:id="rId13"/>
-    <p:sldId id="341" r:id="rId14"/>
-    <p:sldId id="342" r:id="rId15"/>
-    <p:sldId id="343" r:id="rId16"/>
-    <p:sldId id="344" r:id="rId17"/>
-    <p:sldId id="346" r:id="rId18"/>
-    <p:sldId id="348" r:id="rId19"/>
-    <p:sldId id="349" r:id="rId20"/>
-    <p:sldId id="350" r:id="rId21"/>
-    <p:sldId id="351" r:id="rId22"/>
-    <p:sldId id="352" r:id="rId23"/>
-    <p:sldId id="353" r:id="rId24"/>
-    <p:sldId id="354" r:id="rId25"/>
-    <p:sldId id="355" r:id="rId26"/>
-    <p:sldId id="356" r:id="rId27"/>
-    <p:sldId id="357" r:id="rId28"/>
-    <p:sldId id="347" r:id="rId29"/>
-    <p:sldId id="360" r:id="rId30"/>
-    <p:sldId id="361" r:id="rId31"/>
-    <p:sldId id="362" r:id="rId32"/>
-    <p:sldId id="363" r:id="rId33"/>
-    <p:sldId id="364" r:id="rId34"/>
-    <p:sldId id="365" r:id="rId35"/>
-    <p:sldId id="328" r:id="rId36"/>
-    <p:sldId id="275" r:id="rId37"/>
+    <p:sldId id="369" r:id="rId9"/>
+    <p:sldId id="372" r:id="rId10"/>
+    <p:sldId id="367" r:id="rId11"/>
+    <p:sldId id="337" r:id="rId12"/>
+    <p:sldId id="338" r:id="rId13"/>
+    <p:sldId id="339" r:id="rId14"/>
+    <p:sldId id="340" r:id="rId15"/>
+    <p:sldId id="341" r:id="rId16"/>
+    <p:sldId id="342" r:id="rId17"/>
+    <p:sldId id="343" r:id="rId18"/>
+    <p:sldId id="344" r:id="rId19"/>
+    <p:sldId id="371" r:id="rId20"/>
+    <p:sldId id="346" r:id="rId21"/>
+    <p:sldId id="348" r:id="rId22"/>
+    <p:sldId id="349" r:id="rId23"/>
+    <p:sldId id="350" r:id="rId24"/>
+    <p:sldId id="351" r:id="rId25"/>
+    <p:sldId id="352" r:id="rId26"/>
+    <p:sldId id="353" r:id="rId27"/>
+    <p:sldId id="354" r:id="rId28"/>
+    <p:sldId id="355" r:id="rId29"/>
+    <p:sldId id="357" r:id="rId30"/>
+    <p:sldId id="356" r:id="rId31"/>
+    <p:sldId id="360" r:id="rId32"/>
+    <p:sldId id="361" r:id="rId33"/>
+    <p:sldId id="362" r:id="rId34"/>
+    <p:sldId id="363" r:id="rId35"/>
+    <p:sldId id="364" r:id="rId36"/>
+    <p:sldId id="365" r:id="rId37"/>
+    <p:sldId id="370" r:id="rId38"/>
+    <p:sldId id="328" r:id="rId39"/>
+    <p:sldId id="275" r:id="rId40"/>
   </p:sldIdLst>
   <p:sldSz cx="9144000" cy="6858000" type="screen4x3"/>
   <p:notesSz cx="6858000" cy="9144000"/>
@@ -231,7 +234,7 @@
             <a:fld id="{F417C17C-C22B-5A4D-86C6-03CADFB916E7}" type="datetimeFigureOut">
               <a:rPr lang="en-US" smtClean="0"/>
               <a:pPr/>
-              <a:t>3/15/2015</a:t>
+              <a:t>3/23/2015</a:t>
             </a:fld>
             <a:endParaRPr lang="en-US"/>
           </a:p>
@@ -399,7 +402,7 @@
             <a:fld id="{F94EDEDA-1CEA-BB4E-9B95-2149BD5068F1}" type="datetimeFigureOut">
               <a:rPr lang="en-US" smtClean="0"/>
               <a:pPr/>
-              <a:t>3/15/2015</a:t>
+              <a:t>3/23/2015</a:t>
             </a:fld>
             <a:endParaRPr lang="en-US"/>
           </a:p>
@@ -871,7 +874,7 @@
             <a:fld id="{9F1B846B-8A2D-1B40-9656-03CBE7C30F89}" type="datetime1">
               <a:rPr lang="en-US" smtClean="0"/>
               <a:pPr/>
-              <a:t>3/15/2015</a:t>
+              <a:t>3/23/2015</a:t>
             </a:fld>
             <a:endParaRPr lang="en-US"/>
           </a:p>
@@ -1330,7 +1333,7 @@
             <a:fld id="{3AC6D651-2F6B-4F44-9AC2-2874A650DFFF}" type="datetime1">
               <a:rPr lang="en-US" smtClean="0"/>
               <a:pPr/>
-              <a:t>3/15/2015</a:t>
+              <a:t>3/23/2015</a:t>
             </a:fld>
             <a:endParaRPr lang="en-US"/>
           </a:p>
@@ -1879,7 +1882,7 @@
             <a:fld id="{2F9368DD-AF8D-A84E-B015-C56E16CCA0B8}" type="datetime1">
               <a:rPr lang="en-US" smtClean="0"/>
               <a:pPr/>
-              <a:t>3/15/2015</a:t>
+              <a:t>3/23/2015</a:t>
             </a:fld>
             <a:endParaRPr lang="en-US"/>
           </a:p>
@@ -2021,7 +2024,7 @@
             <a:fld id="{51EECA03-0EFE-AE49-AEC4-FF5FAA3318FF}" type="datetime1">
               <a:rPr lang="en-US" smtClean="0"/>
               <a:pPr/>
-              <a:t>3/15/2015</a:t>
+              <a:t>3/23/2015</a:t>
             </a:fld>
             <a:endParaRPr lang="en-US"/>
           </a:p>
@@ -2365,7 +2368,7 @@
             <a:fld id="{AC99F442-9D35-CD43-AF7C-482407A7E448}" type="datetime1">
               <a:rPr lang="en-US" smtClean="0"/>
               <a:pPr/>
-              <a:t>3/15/2015</a:t>
+              <a:t>3/23/2015</a:t>
             </a:fld>
             <a:endParaRPr lang="en-US"/>
           </a:p>
@@ -2696,7 +2699,7 @@
             <a:fld id="{6FF29FFD-6E86-7D41-8B06-D97C95FD9989}" type="datetime1">
               <a:rPr lang="en-US" smtClean="0"/>
               <a:pPr/>
-              <a:t>3/15/2015</a:t>
+              <a:t>3/23/2015</a:t>
             </a:fld>
             <a:endParaRPr lang="en-US"/>
           </a:p>
@@ -3000,7 +3003,7 @@
             <a:fld id="{A7DDD598-7C70-AD4A-A0DD-92D30AAA5510}" type="datetime1">
               <a:rPr lang="en-US" smtClean="0"/>
               <a:pPr/>
-              <a:t>3/15/2015</a:t>
+              <a:t>3/23/2015</a:t>
             </a:fld>
             <a:endParaRPr lang="en-US"/>
           </a:p>
@@ -3393,7 +3396,7 @@
             <a:fld id="{69AB95C5-5C4D-2440-955D-3D443FE41120}" type="datetime1">
               <a:rPr lang="en-US" smtClean="0"/>
               <a:pPr/>
-              <a:t>3/15/2015</a:t>
+              <a:t>3/23/2015</a:t>
             </a:fld>
             <a:endParaRPr lang="en-US"/>
           </a:p>
@@ -3819,7 +3822,7 @@
             <a:fld id="{7A3B19C7-97AD-7A44-9B9C-A4CD352EDF8C}" type="datetime1">
               <a:rPr lang="en-US" smtClean="0"/>
               <a:pPr/>
-              <a:t>3/15/2015</a:t>
+              <a:t>3/23/2015</a:t>
             </a:fld>
             <a:endParaRPr lang="en-US"/>
           </a:p>
@@ -4373,7 +4376,7 @@
             <a:fld id="{400A512E-66E8-C943-9CDD-ABCDE7307FC5}" type="datetime1">
               <a:rPr lang="en-US" smtClean="0"/>
               <a:pPr/>
-              <a:t>3/15/2015</a:t>
+              <a:t>3/23/2015</a:t>
             </a:fld>
             <a:endParaRPr lang="en-US"/>
           </a:p>
@@ -4737,7 +4740,7 @@
             <a:fld id="{275737D3-87B9-8A41-9F3E-456EAA10E2F7}" type="datetime1">
               <a:rPr lang="en-US" smtClean="0"/>
               <a:pPr/>
-              <a:t>3/15/2015</a:t>
+              <a:t>3/23/2015</a:t>
             </a:fld>
             <a:endParaRPr lang="en-US"/>
           </a:p>
@@ -4958,7 +4961,7 @@
             <a:fld id="{3B13B7C4-28A5-CB48-9F90-61EEE4FDDD8B}" type="datetime1">
               <a:rPr lang="en-US" smtClean="0"/>
               <a:pPr/>
-              <a:t>3/15/2015</a:t>
+              <a:t>3/23/2015</a:t>
             </a:fld>
             <a:endParaRPr lang="en-US"/>
           </a:p>
@@ -5271,7 +5274,7 @@
             <a:fld id="{FB820ADC-A989-0B43-894B-CC8B88A6A058}" type="datetime1">
               <a:rPr lang="en-US" smtClean="0"/>
               <a:pPr/>
-              <a:t>3/15/2015</a:t>
+              <a:t>3/23/2015</a:t>
             </a:fld>
             <a:endParaRPr lang="en-US"/>
           </a:p>
@@ -5533,7 +5536,7 @@
             <a:fld id="{6EFD7B0D-1D9A-AA44-8AA0-36F432394321}" type="datetime1">
               <a:rPr lang="en-US" smtClean="0"/>
               <a:pPr/>
-              <a:t>3/15/2015</a:t>
+              <a:t>3/23/2015</a:t>
             </a:fld>
             <a:endParaRPr lang="en-US"/>
           </a:p>
@@ -5928,7 +5931,7 @@
             <a:fld id="{8391D6BE-CC5A-F441-BF5C-132B93EAE0B9}" type="datetime1">
               <a:rPr lang="en-US" smtClean="0"/>
               <a:pPr/>
-              <a:t>3/15/2015</a:t>
+              <a:t>3/23/2015</a:t>
             </a:fld>
             <a:endParaRPr lang="en-US"/>
           </a:p>
@@ -6522,7 +6525,7 @@
             <a:fld id="{7F9E5D33-2821-C642-A5E0-67CD027085C0}" type="datetime1">
               <a:rPr lang="en-US" smtClean="0"/>
               <a:pPr/>
-              <a:t>3/15/2015</a:t>
+              <a:t>3/23/2015</a:t>
             </a:fld>
             <a:endParaRPr lang="en-US"/>
           </a:p>
@@ -7043,7 +7046,7 @@
             <a:fld id="{B4EE926D-75E4-7C4A-80EF-E6F745BAF0A6}" type="datetime1">
               <a:rPr lang="en-US" smtClean="0"/>
               <a:pPr/>
-              <a:t>3/15/2015</a:t>
+              <a:t>3/23/2015</a:t>
             </a:fld>
             <a:endParaRPr lang="en-US"/>
           </a:p>
@@ -7422,7 +7425,7 @@
             <a:fld id="{1799AEC9-6A91-FD48-8C26-85D761A9AB9A}" type="datetime1">
               <a:rPr lang="en-US" smtClean="0"/>
               <a:pPr/>
-              <a:t>3/15/2015</a:t>
+              <a:t>3/23/2015</a:t>
             </a:fld>
             <a:endParaRPr lang="en-US"/>
           </a:p>
@@ -7827,7 +7830,7 @@
             <a:fld id="{72AB3F87-F2CF-AA47-8A3C-25D7BBB8800D}" type="datetime1">
               <a:rPr lang="en-US" smtClean="0"/>
               <a:pPr/>
-              <a:t>3/15/2015</a:t>
+              <a:t>3/23/2015</a:t>
             </a:fld>
             <a:endParaRPr lang="en-US"/>
           </a:p>
@@ -8253,7 +8256,7 @@
             <a:fld id="{017A4C3A-78B7-E146-B561-C5924296E830}" type="datetime1">
               <a:rPr lang="en-US" smtClean="0"/>
               <a:pPr/>
-              <a:t>3/15/2015</a:t>
+              <a:t>3/23/2015</a:t>
             </a:fld>
             <a:endParaRPr lang="en-US"/>
           </a:p>
@@ -8642,7 +8645,7 @@
             <a:fld id="{9F7D4429-93BD-BC4F-94A7-C9B3C2CD0DC0}" type="datetime1">
               <a:rPr lang="en-US" smtClean="0"/>
               <a:pPr/>
-              <a:t>3/15/2015</a:t>
+              <a:t>3/23/2015</a:t>
             </a:fld>
             <a:endParaRPr lang="en-US"/>
           </a:p>
@@ -9240,6 +9243,280 @@
           <a:p>
             <a:r>
               <a:rPr lang="en-US" dirty="0" smtClean="0"/>
+              <a:t>Preparing Text</a:t>
+            </a:r>
+            <a:endParaRPr lang="en-US" dirty="0"/>
+          </a:p>
+        </p:txBody>
+      </p:sp>
+      <p:sp>
+        <p:nvSpPr>
+          <p:cNvPr id="3" name="Content Placeholder 2"/>
+          <p:cNvSpPr>
+            <a:spLocks noGrp="1"/>
+          </p:cNvSpPr>
+          <p:nvPr>
+            <p:ph idx="1"/>
+          </p:nvPr>
+        </p:nvSpPr>
+        <p:spPr/>
+        <p:txBody>
+          <a:bodyPr/>
+          <a:lstStyle/>
+          <a:p>
+            <a:r>
+              <a:rPr lang="en-US" dirty="0" smtClean="0"/>
+              <a:t>Normally, very common words like “the,” “of”, or “and” are removed – these are called stop words.</a:t>
+            </a:r>
+          </a:p>
+          <a:p>
+            <a:r>
+              <a:rPr lang="en-US" dirty="0" smtClean="0"/>
+              <a:t>Words are usually “stemmed” down to their root – we use a package called “snowball” to accomplish this.</a:t>
+            </a:r>
+          </a:p>
+          <a:p>
+            <a:r>
+              <a:rPr lang="en-US" dirty="0" smtClean="0"/>
+              <a:t>We also clean up text, removing numbers, punctuation, and </a:t>
+            </a:r>
+            <a:r>
+              <a:rPr lang="en-US" dirty="0" err="1" smtClean="0"/>
+              <a:t>superflous</a:t>
+            </a:r>
+            <a:r>
+              <a:rPr lang="en-US" dirty="0" smtClean="0"/>
+              <a:t> whitespace.</a:t>
+            </a:r>
+          </a:p>
+          <a:p>
+            <a:r>
+              <a:rPr lang="en-US" dirty="0" smtClean="0"/>
+              <a:t>At the end, we have a dictionary of words, and for each document we have each of the terms as a vector dimension.</a:t>
+            </a:r>
+          </a:p>
+        </p:txBody>
+      </p:sp>
+      <p:sp>
+        <p:nvSpPr>
+          <p:cNvPr id="4" name="Footer Placeholder 3"/>
+          <p:cNvSpPr>
+            <a:spLocks noGrp="1"/>
+          </p:cNvSpPr>
+          <p:nvPr>
+            <p:ph type="ftr" sz="quarter" idx="11"/>
+          </p:nvPr>
+        </p:nvSpPr>
+        <p:spPr/>
+        <p:txBody>
+          <a:bodyPr/>
+          <a:lstStyle/>
+          <a:p>
+            <a:r>
+              <a:rPr lang="en-US" smtClean="0"/>
+              <a:t>(c) ElephantScale.com 2014</a:t>
+            </a:r>
+            <a:endParaRPr lang="en-US"/>
+          </a:p>
+        </p:txBody>
+      </p:sp>
+      <p:sp>
+        <p:nvSpPr>
+          <p:cNvPr id="5" name="Slide Number Placeholder 4"/>
+          <p:cNvSpPr>
+            <a:spLocks noGrp="1"/>
+          </p:cNvSpPr>
+          <p:nvPr>
+            <p:ph type="sldNum" sz="quarter" idx="12"/>
+          </p:nvPr>
+        </p:nvSpPr>
+        <p:spPr/>
+        <p:txBody>
+          <a:bodyPr/>
+          <a:lstStyle/>
+          <a:p>
+            <a:fld id="{4AD8DDEF-9CD1-B641-ADE5-2BEE59567BE6}" type="slidenum">
+              <a:rPr lang="en-US" smtClean="0"/>
+              <a:pPr/>
+              <a:t>10</a:t>
+            </a:fld>
+            <a:endParaRPr lang="en-US"/>
+          </a:p>
+        </p:txBody>
+      </p:sp>
+    </p:spTree>
+    <p:extLst>
+      <p:ext uri="{BB962C8B-B14F-4D97-AF65-F5344CB8AC3E}">
+        <p14:creationId xmlns:p14="http://schemas.microsoft.com/office/powerpoint/2010/main" xmlns="" val="1413752634"/>
+      </p:ext>
+    </p:extLst>
+  </p:cSld>
+  <p:clrMapOvr>
+    <a:masterClrMapping/>
+  </p:clrMapOvr>
+  <p:timing>
+    <p:tnLst>
+      <p:par>
+        <p:cTn id="1" dur="indefinite" restart="never" nodeType="tmRoot"/>
+      </p:par>
+    </p:tnLst>
+  </p:timing>
+</p:sld>
+</file>
+
+<file path=ppt/slides/slide11.xml><?xml version="1.0" encoding="utf-8"?>
+<p:sld xmlns:a="http://schemas.openxmlformats.org/drawingml/2006/main" xmlns:r="http://schemas.openxmlformats.org/officeDocument/2006/relationships" xmlns:p="http://schemas.openxmlformats.org/presentationml/2006/main">
+  <p:cSld>
+    <p:spTree>
+      <p:nvGrpSpPr>
+        <p:cNvPr id="1" name=""/>
+        <p:cNvGrpSpPr/>
+        <p:nvPr/>
+      </p:nvGrpSpPr>
+      <p:grpSpPr>
+        <a:xfrm>
+          <a:off x="0" y="0"/>
+          <a:ext cx="0" cy="0"/>
+          <a:chOff x="0" y="0"/>
+          <a:chExt cx="0" cy="0"/>
+        </a:xfrm>
+      </p:grpSpPr>
+      <p:sp>
+        <p:nvSpPr>
+          <p:cNvPr id="2" name="Title 1"/>
+          <p:cNvSpPr>
+            <a:spLocks noGrp="1"/>
+          </p:cNvSpPr>
+          <p:nvPr>
+            <p:ph type="title"/>
+          </p:nvPr>
+        </p:nvSpPr>
+        <p:spPr/>
+        <p:txBody>
+          <a:bodyPr/>
+          <a:lstStyle/>
+          <a:p>
+            <a:r>
+              <a:rPr lang="en-US" dirty="0" smtClean="0"/>
+              <a:t>Next : Clustering</a:t>
+            </a:r>
+            <a:endParaRPr lang="en-US" dirty="0"/>
+          </a:p>
+        </p:txBody>
+      </p:sp>
+      <p:sp>
+        <p:nvSpPr>
+          <p:cNvPr id="3" name="Content Placeholder 2"/>
+          <p:cNvSpPr>
+            <a:spLocks noGrp="1"/>
+          </p:cNvSpPr>
+          <p:nvPr>
+            <p:ph idx="1"/>
+          </p:nvPr>
+        </p:nvSpPr>
+        <p:spPr/>
+        <p:txBody>
+          <a:bodyPr/>
+          <a:lstStyle/>
+          <a:p>
+            <a:endParaRPr lang="en-US"/>
+          </a:p>
+        </p:txBody>
+      </p:sp>
+      <p:sp>
+        <p:nvSpPr>
+          <p:cNvPr id="4" name="Footer Placeholder 3"/>
+          <p:cNvSpPr>
+            <a:spLocks noGrp="1"/>
+          </p:cNvSpPr>
+          <p:nvPr>
+            <p:ph type="ftr" sz="quarter" idx="11"/>
+          </p:nvPr>
+        </p:nvSpPr>
+        <p:spPr/>
+        <p:txBody>
+          <a:bodyPr/>
+          <a:lstStyle/>
+          <a:p>
+            <a:r>
+              <a:rPr lang="en-US" smtClean="0"/>
+              <a:t>(c) ElephantScale.com 2014</a:t>
+            </a:r>
+            <a:endParaRPr lang="en-US"/>
+          </a:p>
+        </p:txBody>
+      </p:sp>
+      <p:sp>
+        <p:nvSpPr>
+          <p:cNvPr id="5" name="Slide Number Placeholder 4"/>
+          <p:cNvSpPr>
+            <a:spLocks noGrp="1"/>
+          </p:cNvSpPr>
+          <p:nvPr>
+            <p:ph type="sldNum" sz="quarter" idx="12"/>
+          </p:nvPr>
+        </p:nvSpPr>
+        <p:spPr/>
+        <p:txBody>
+          <a:bodyPr/>
+          <a:lstStyle/>
+          <a:p>
+            <a:fld id="{4AD8DDEF-9CD1-B641-ADE5-2BEE59567BE6}" type="slidenum">
+              <a:rPr lang="en-US" smtClean="0"/>
+              <a:pPr/>
+              <a:t>11</a:t>
+            </a:fld>
+            <a:endParaRPr lang="en-US"/>
+          </a:p>
+        </p:txBody>
+      </p:sp>
+    </p:spTree>
+    <p:extLst>
+      <p:ext uri="{BB962C8B-B14F-4D97-AF65-F5344CB8AC3E}">
+        <p14:creationId xmlns:p14="http://schemas.microsoft.com/office/powerpoint/2010/main" xmlns="" val="2260624955"/>
+      </p:ext>
+    </p:extLst>
+  </p:cSld>
+  <p:clrMapOvr>
+    <a:masterClrMapping/>
+  </p:clrMapOvr>
+</p:sld>
+</file>
+
+<file path=ppt/slides/slide12.xml><?xml version="1.0" encoding="utf-8"?>
+<p:sld xmlns:a="http://schemas.openxmlformats.org/drawingml/2006/main" xmlns:r="http://schemas.openxmlformats.org/officeDocument/2006/relationships" xmlns:p="http://schemas.openxmlformats.org/presentationml/2006/main">
+  <p:cSld>
+    <p:spTree>
+      <p:nvGrpSpPr>
+        <p:cNvPr id="1" name=""/>
+        <p:cNvGrpSpPr/>
+        <p:nvPr/>
+      </p:nvGrpSpPr>
+      <p:grpSpPr>
+        <a:xfrm>
+          <a:off x="0" y="0"/>
+          <a:ext cx="0" cy="0"/>
+          <a:chOff x="0" y="0"/>
+          <a:chExt cx="0" cy="0"/>
+        </a:xfrm>
+      </p:grpSpPr>
+      <p:sp>
+        <p:nvSpPr>
+          <p:cNvPr id="2" name="Title 1"/>
+          <p:cNvSpPr>
+            <a:spLocks noGrp="1"/>
+          </p:cNvSpPr>
+          <p:nvPr>
+            <p:ph type="title"/>
+          </p:nvPr>
+        </p:nvSpPr>
+        <p:spPr/>
+        <p:txBody>
+          <a:bodyPr/>
+          <a:lstStyle/>
+          <a:p>
+            <a:r>
+              <a:rPr lang="en-US" dirty="0" smtClean="0"/>
               <a:t>Clustering Applications</a:t>
             </a:r>
             <a:endParaRPr lang="en-US" dirty="0"/>
@@ -9306,7 +9583,7 @@
             <a:fld id="{4AD8DDEF-9CD1-B641-ADE5-2BEE59567BE6}" type="slidenum">
               <a:rPr lang="en-US" smtClean="0"/>
               <a:pPr/>
-              <a:t>10</a:t>
+              <a:t>12</a:t>
             </a:fld>
             <a:endParaRPr lang="en-US"/>
           </a:p>
@@ -9465,7 +9742,7 @@
 </p:sld>
 </file>
 
-<file path=ppt/slides/slide11.xml><?xml version="1.0" encoding="utf-8"?>
+<file path=ppt/slides/slide13.xml><?xml version="1.0" encoding="utf-8"?>
 <p:sld xmlns:a="http://schemas.openxmlformats.org/drawingml/2006/main" xmlns:r="http://schemas.openxmlformats.org/officeDocument/2006/relationships" xmlns:p="http://schemas.openxmlformats.org/presentationml/2006/main">
   <p:cSld>
     <p:spTree>
@@ -9533,11 +9810,7 @@
           <a:p>
             <a:r>
               <a:rPr lang="en-US" dirty="0" smtClean="0"/>
-              <a:t>Simplest </a:t>
-            </a:r>
-            <a:r>
-              <a:rPr lang="en-US" dirty="0" smtClean="0"/>
-              <a:t>is k-means</a:t>
+              <a:t>Simplest is k-means</a:t>
             </a:r>
           </a:p>
           <a:p>
@@ -9592,7 +9865,7 @@
             <a:fld id="{4AD8DDEF-9CD1-B641-ADE5-2BEE59567BE6}" type="slidenum">
               <a:rPr lang="en-US" smtClean="0"/>
               <a:pPr/>
-              <a:t>11</a:t>
+              <a:t>13</a:t>
             </a:fld>
             <a:endParaRPr lang="en-US"/>
           </a:p>
@@ -9642,7 +9915,7 @@
 </p:sld>
 </file>
 
-<file path=ppt/slides/slide12.xml><?xml version="1.0" encoding="utf-8"?>
+<file path=ppt/slides/slide14.xml><?xml version="1.0" encoding="utf-8"?>
 <p:sld xmlns:a="http://schemas.openxmlformats.org/drawingml/2006/main" xmlns:r="http://schemas.openxmlformats.org/officeDocument/2006/relationships" xmlns:p="http://schemas.openxmlformats.org/presentationml/2006/main">
   <p:cSld>
     <p:spTree>
@@ -9701,7 +9974,6 @@
               <a:rPr lang="en-US" dirty="0" smtClean="0"/>
               <a:t>K-Means: Simplest Clustering Algorithm.</a:t>
             </a:r>
-            <a:endParaRPr lang="en-US" dirty="0" smtClean="0"/>
           </a:p>
           <a:p>
             <a:r>
@@ -9788,7 +10060,7 @@
             <a:fld id="{4AD8DDEF-9CD1-B641-ADE5-2BEE59567BE6}" type="slidenum">
               <a:rPr lang="en-US" smtClean="0"/>
               <a:pPr/>
-              <a:t>12</a:t>
+              <a:t>14</a:t>
             </a:fld>
             <a:endParaRPr lang="en-US"/>
           </a:p>
@@ -9862,7 +10134,7 @@
 </p:sld>
 </file>
 
-<file path=ppt/slides/slide13.xml><?xml version="1.0" encoding="utf-8"?>
+<file path=ppt/slides/slide15.xml><?xml version="1.0" encoding="utf-8"?>
 <p:sld xmlns:a="http://schemas.openxmlformats.org/drawingml/2006/main" xmlns:r="http://schemas.openxmlformats.org/officeDocument/2006/relationships" xmlns:p="http://schemas.openxmlformats.org/presentationml/2006/main">
   <p:cSld>
     <p:spTree>
@@ -10001,7 +10273,7 @@
             <a:fld id="{4AD8DDEF-9CD1-B641-ADE5-2BEE59567BE6}" type="slidenum">
               <a:rPr lang="en-US" smtClean="0"/>
               <a:pPr/>
-              <a:t>13</a:t>
+              <a:t>15</a:t>
             </a:fld>
             <a:endParaRPr lang="en-US"/>
           </a:p>
@@ -10075,391 +10347,6 @@
 </p:sld>
 </file>
 
-<file path=ppt/slides/slide14.xml><?xml version="1.0" encoding="utf-8"?>
-<p:sld xmlns:a="http://schemas.openxmlformats.org/drawingml/2006/main" xmlns:r="http://schemas.openxmlformats.org/officeDocument/2006/relationships" xmlns:p="http://schemas.openxmlformats.org/presentationml/2006/main">
-  <p:cSld>
-    <p:spTree>
-      <p:nvGrpSpPr>
-        <p:cNvPr id="1" name=""/>
-        <p:cNvGrpSpPr/>
-        <p:nvPr/>
-      </p:nvGrpSpPr>
-      <p:grpSpPr>
-        <a:xfrm>
-          <a:off x="0" y="0"/>
-          <a:ext cx="0" cy="0"/>
-          <a:chOff x="0" y="0"/>
-          <a:chExt cx="0" cy="0"/>
-        </a:xfrm>
-      </p:grpSpPr>
-      <p:sp>
-        <p:nvSpPr>
-          <p:cNvPr id="2" name="Title 1"/>
-          <p:cNvSpPr>
-            <a:spLocks noGrp="1"/>
-          </p:cNvSpPr>
-          <p:nvPr>
-            <p:ph type="title"/>
-          </p:nvPr>
-        </p:nvSpPr>
-        <p:spPr/>
-        <p:txBody>
-          <a:bodyPr/>
-          <a:lstStyle/>
-          <a:p>
-            <a:r>
-              <a:rPr lang="en-US" dirty="0" smtClean="0"/>
-              <a:t>K-Means Distance Measurements</a:t>
-            </a:r>
-            <a:endParaRPr lang="en-US" dirty="0"/>
-          </a:p>
-        </p:txBody>
-      </p:sp>
-      <p:sp>
-        <p:nvSpPr>
-          <p:cNvPr id="3" name="Content Placeholder 2"/>
-          <p:cNvSpPr>
-            <a:spLocks noGrp="1"/>
-          </p:cNvSpPr>
-          <p:nvPr>
-            <p:ph idx="1"/>
-          </p:nvPr>
-        </p:nvSpPr>
-        <p:spPr/>
-        <p:txBody>
-          <a:bodyPr/>
-          <a:lstStyle/>
-          <a:p>
-            <a:r>
-              <a:rPr lang="en-US" dirty="0" smtClean="0"/>
-              <a:t>Ways to Determine Distance</a:t>
-            </a:r>
-            <a:endParaRPr lang="en-US" dirty="0" smtClean="0"/>
-          </a:p>
-          <a:p>
-            <a:pPr lvl="1"/>
-            <a:r>
-              <a:rPr lang="en-US" dirty="0" smtClean="0"/>
-              <a:t>Euclidian distance – </a:t>
-            </a:r>
-            <a:r>
-              <a:rPr lang="en-US" dirty="0" smtClean="0"/>
-              <a:t>(most obvious) Euclidian</a:t>
-            </a:r>
-            <a:r>
-              <a:rPr lang="en-US" dirty="0" smtClean="0"/>
-              <a:t>, which takes the distance in Euclidian space</a:t>
-            </a:r>
-          </a:p>
-          <a:p>
-            <a:pPr lvl="1"/>
-            <a:r>
-              <a:rPr lang="en-US" dirty="0" smtClean="0"/>
-              <a:t>Cosine Distance – </a:t>
-            </a:r>
-            <a:r>
-              <a:rPr lang="en-US" dirty="0" smtClean="0"/>
-              <a:t>cosine of angle between vectors – ignores magnitude</a:t>
-            </a:r>
-            <a:endParaRPr lang="en-US" dirty="0" smtClean="0"/>
-          </a:p>
-          <a:p>
-            <a:pPr lvl="1"/>
-            <a:r>
-              <a:rPr lang="en-US" dirty="0" smtClean="0"/>
-              <a:t>Manhattan distance: Effectively counts the number of square blocks one would “walk” to get there without cutting corners.</a:t>
-            </a:r>
-          </a:p>
-          <a:p>
-            <a:pPr lvl="1"/>
-            <a:r>
-              <a:rPr lang="en-US" dirty="0" err="1" smtClean="0"/>
-              <a:t>Tanimoto</a:t>
-            </a:r>
-            <a:r>
-              <a:rPr lang="en-US" dirty="0" smtClean="0"/>
-              <a:t> distance  Take both angle and magnitude into account.</a:t>
-            </a:r>
-          </a:p>
-          <a:p>
-            <a:r>
-              <a:rPr lang="en-US" dirty="0" smtClean="0"/>
-              <a:t>Most algorithms attempt to balance the</a:t>
-            </a:r>
-          </a:p>
-          <a:p>
-            <a:pPr lvl="1"/>
-            <a:r>
-              <a:rPr lang="en-US" dirty="0" smtClean="0"/>
-              <a:t>Magnitude</a:t>
-            </a:r>
-          </a:p>
-          <a:p>
-            <a:pPr lvl="1"/>
-            <a:r>
-              <a:rPr lang="en-US" dirty="0" smtClean="0"/>
-              <a:t>Angle</a:t>
-            </a:r>
-            <a:endParaRPr lang="en-US" dirty="0" smtClean="0"/>
-          </a:p>
-          <a:p>
-            <a:pPr lvl="1"/>
-            <a:endParaRPr lang="en-US" dirty="0" smtClean="0"/>
-          </a:p>
-        </p:txBody>
-      </p:sp>
-      <p:sp>
-        <p:nvSpPr>
-          <p:cNvPr id="4" name="Footer Placeholder 3"/>
-          <p:cNvSpPr>
-            <a:spLocks noGrp="1"/>
-          </p:cNvSpPr>
-          <p:nvPr>
-            <p:ph type="ftr" sz="quarter" idx="11"/>
-          </p:nvPr>
-        </p:nvSpPr>
-        <p:spPr/>
-        <p:txBody>
-          <a:bodyPr/>
-          <a:lstStyle/>
-          <a:p>
-            <a:r>
-              <a:rPr lang="en-US" smtClean="0"/>
-              <a:t>(c) ElephantScale.com 2014</a:t>
-            </a:r>
-            <a:endParaRPr lang="en-US"/>
-          </a:p>
-        </p:txBody>
-      </p:sp>
-      <p:sp>
-        <p:nvSpPr>
-          <p:cNvPr id="5" name="Slide Number Placeholder 4"/>
-          <p:cNvSpPr>
-            <a:spLocks noGrp="1"/>
-          </p:cNvSpPr>
-          <p:nvPr>
-            <p:ph type="sldNum" sz="quarter" idx="12"/>
-          </p:nvPr>
-        </p:nvSpPr>
-        <p:spPr/>
-        <p:txBody>
-          <a:bodyPr/>
-          <a:lstStyle/>
-          <a:p>
-            <a:fld id="{4AD8DDEF-9CD1-B641-ADE5-2BEE59567BE6}" type="slidenum">
-              <a:rPr lang="en-US" smtClean="0"/>
-              <a:pPr/>
-              <a:t>14</a:t>
-            </a:fld>
-            <a:endParaRPr lang="en-US"/>
-          </a:p>
-        </p:txBody>
-      </p:sp>
-    </p:spTree>
-    <p:extLst>
-      <p:ext uri="{BB962C8B-B14F-4D97-AF65-F5344CB8AC3E}">
-        <p14:creationId xmlns:p14="http://schemas.microsoft.com/office/powerpoint/2010/main" xmlns="" val="3017253226"/>
-      </p:ext>
-    </p:extLst>
-  </p:cSld>
-  <p:clrMapOvr>
-    <a:masterClrMapping/>
-  </p:clrMapOvr>
-  <p:timing>
-    <p:tnLst>
-      <p:par>
-        <p:cTn id="1" dur="indefinite" restart="never" nodeType="tmRoot"/>
-      </p:par>
-    </p:tnLst>
-  </p:timing>
-</p:sld>
-</file>
-
-<file path=ppt/slides/slide15.xml><?xml version="1.0" encoding="utf-8"?>
-<p:sld xmlns:a="http://schemas.openxmlformats.org/drawingml/2006/main" xmlns:r="http://schemas.openxmlformats.org/officeDocument/2006/relationships" xmlns:p="http://schemas.openxmlformats.org/presentationml/2006/main">
-  <p:cSld>
-    <p:spTree>
-      <p:nvGrpSpPr>
-        <p:cNvPr id="1" name=""/>
-        <p:cNvGrpSpPr/>
-        <p:nvPr/>
-      </p:nvGrpSpPr>
-      <p:grpSpPr>
-        <a:xfrm>
-          <a:off x="0" y="0"/>
-          <a:ext cx="0" cy="0"/>
-          <a:chOff x="0" y="0"/>
-          <a:chExt cx="0" cy="0"/>
-        </a:xfrm>
-      </p:grpSpPr>
-      <p:sp>
-        <p:nvSpPr>
-          <p:cNvPr id="2" name="Title 1"/>
-          <p:cNvSpPr>
-            <a:spLocks noGrp="1"/>
-          </p:cNvSpPr>
-          <p:nvPr>
-            <p:ph type="title"/>
-          </p:nvPr>
-        </p:nvSpPr>
-        <p:spPr/>
-        <p:txBody>
-          <a:bodyPr/>
-          <a:lstStyle/>
-          <a:p>
-            <a:r>
-              <a:rPr lang="en-US" dirty="0" smtClean="0"/>
-              <a:t>K-Means Clustering Summary</a:t>
-            </a:r>
-            <a:endParaRPr lang="en-US" dirty="0"/>
-          </a:p>
-        </p:txBody>
-      </p:sp>
-      <p:sp>
-        <p:nvSpPr>
-          <p:cNvPr id="3" name="Content Placeholder 2"/>
-          <p:cNvSpPr>
-            <a:spLocks noGrp="1"/>
-          </p:cNvSpPr>
-          <p:nvPr>
-            <p:ph idx="1"/>
-          </p:nvPr>
-        </p:nvSpPr>
-        <p:spPr/>
-        <p:txBody>
-          <a:bodyPr/>
-          <a:lstStyle/>
-          <a:p>
-            <a:r>
-              <a:rPr lang="en-US" dirty="0" smtClean="0"/>
-              <a:t>K-Means is simple</a:t>
-            </a:r>
-          </a:p>
-          <a:p>
-            <a:pPr lvl="1"/>
-            <a:r>
-              <a:rPr lang="en-US" dirty="0" smtClean="0"/>
-              <a:t>Well-Understood.</a:t>
-            </a:r>
-            <a:endParaRPr lang="en-US" dirty="0" smtClean="0"/>
-          </a:p>
-          <a:p>
-            <a:r>
-              <a:rPr lang="en-US" dirty="0" smtClean="0"/>
-              <a:t>Disadvantages are that:</a:t>
-            </a:r>
-          </a:p>
-          <a:p>
-            <a:pPr lvl="1"/>
-            <a:r>
-              <a:rPr lang="en-US" dirty="0" smtClean="0"/>
-              <a:t>Value of k must be known in advance – which may mean running the exercise many times to get optimum results.</a:t>
-            </a:r>
-          </a:p>
-          <a:p>
-            <a:pPr lvl="1"/>
-            <a:r>
-              <a:rPr lang="en-US" dirty="0" smtClean="0"/>
-              <a:t>Initial </a:t>
-            </a:r>
-            <a:r>
-              <a:rPr lang="en-US" dirty="0" err="1" smtClean="0"/>
-              <a:t>centroid</a:t>
-            </a:r>
-            <a:r>
-              <a:rPr lang="en-US" dirty="0" smtClean="0"/>
-              <a:t> positions are important; may cause long convergence.</a:t>
-            </a:r>
-            <a:endParaRPr lang="en-US" dirty="0" smtClean="0"/>
-          </a:p>
-          <a:p>
-            <a:pPr lvl="1"/>
-            <a:r>
-              <a:rPr lang="en-US" dirty="0" smtClean="0"/>
-              <a:t>Dense groupings of points are not especially considered</a:t>
-            </a:r>
-          </a:p>
-          <a:p>
-            <a:pPr lvl="2"/>
-            <a:r>
-              <a:rPr lang="en-US" dirty="0" smtClean="0"/>
-              <a:t>Outliers may bias results.</a:t>
-            </a:r>
-            <a:endParaRPr lang="en-US" dirty="0" smtClean="0"/>
-          </a:p>
-          <a:p>
-            <a:pPr lvl="1"/>
-            <a:endParaRPr lang="en-US" dirty="0" smtClean="0"/>
-          </a:p>
-        </p:txBody>
-      </p:sp>
-      <p:sp>
-        <p:nvSpPr>
-          <p:cNvPr id="4" name="Footer Placeholder 3"/>
-          <p:cNvSpPr>
-            <a:spLocks noGrp="1"/>
-          </p:cNvSpPr>
-          <p:nvPr>
-            <p:ph type="ftr" sz="quarter" idx="11"/>
-          </p:nvPr>
-        </p:nvSpPr>
-        <p:spPr/>
-        <p:txBody>
-          <a:bodyPr/>
-          <a:lstStyle/>
-          <a:p>
-            <a:r>
-              <a:rPr lang="en-US" smtClean="0"/>
-              <a:t>(c) ElephantScale.com 2014</a:t>
-            </a:r>
-            <a:endParaRPr lang="en-US"/>
-          </a:p>
-        </p:txBody>
-      </p:sp>
-      <p:sp>
-        <p:nvSpPr>
-          <p:cNvPr id="5" name="Slide Number Placeholder 4"/>
-          <p:cNvSpPr>
-            <a:spLocks noGrp="1"/>
-          </p:cNvSpPr>
-          <p:nvPr>
-            <p:ph type="sldNum" sz="quarter" idx="12"/>
-          </p:nvPr>
-        </p:nvSpPr>
-        <p:spPr/>
-        <p:txBody>
-          <a:bodyPr/>
-          <a:lstStyle/>
-          <a:p>
-            <a:fld id="{4AD8DDEF-9CD1-B641-ADE5-2BEE59567BE6}" type="slidenum">
-              <a:rPr lang="en-US" smtClean="0"/>
-              <a:pPr/>
-              <a:t>15</a:t>
-            </a:fld>
-            <a:endParaRPr lang="en-US"/>
-          </a:p>
-        </p:txBody>
-      </p:sp>
-    </p:spTree>
-    <p:extLst>
-      <p:ext uri="{BB962C8B-B14F-4D97-AF65-F5344CB8AC3E}">
-        <p14:creationId xmlns:p14="http://schemas.microsoft.com/office/powerpoint/2010/main" xmlns="" val="1791869827"/>
-      </p:ext>
-    </p:extLst>
-  </p:cSld>
-  <p:clrMapOvr>
-    <a:masterClrMapping/>
-  </p:clrMapOvr>
-  <p:timing>
-    <p:tnLst>
-      <p:par>
-        <p:cTn id="1" dur="indefinite" restart="never" nodeType="tmRoot"/>
-      </p:par>
-    </p:tnLst>
-  </p:timing>
-</p:sld>
-</file>
-
 <file path=ppt/slides/slide16.xml><?xml version="1.0" encoding="utf-8"?>
 <p:sld xmlns:a="http://schemas.openxmlformats.org/drawingml/2006/main" xmlns:r="http://schemas.openxmlformats.org/officeDocument/2006/relationships" xmlns:p="http://schemas.openxmlformats.org/presentationml/2006/main">
   <p:cSld>
@@ -10494,93 +10381,83 @@
           <a:p>
             <a:r>
               <a:rPr lang="en-US" dirty="0" smtClean="0"/>
-              <a:t>K-Means in </a:t>
-            </a:r>
+              <a:t>K-Means Distance Measurements</a:t>
+            </a:r>
+            <a:endParaRPr lang="en-US" dirty="0"/>
+          </a:p>
+        </p:txBody>
+      </p:sp>
+      <p:sp>
+        <p:nvSpPr>
+          <p:cNvPr id="3" name="Content Placeholder 2"/>
+          <p:cNvSpPr>
+            <a:spLocks noGrp="1"/>
+          </p:cNvSpPr>
+          <p:nvPr>
+            <p:ph idx="1"/>
+          </p:nvPr>
+        </p:nvSpPr>
+        <p:spPr/>
+        <p:txBody>
+          <a:bodyPr/>
+          <a:lstStyle/>
+          <a:p>
+            <a:r>
+              <a:rPr lang="en-US" dirty="0" smtClean="0"/>
+              <a:t>Ways to Determine Distance</a:t>
+            </a:r>
+          </a:p>
+          <a:p>
+            <a:pPr lvl="1"/>
+            <a:r>
+              <a:rPr lang="en-US" dirty="0" smtClean="0"/>
+              <a:t>Euclidian distance – (most obvious) Euclidian, which takes the distance in Euclidian space</a:t>
+            </a:r>
+          </a:p>
+          <a:p>
+            <a:pPr lvl="1"/>
+            <a:r>
+              <a:rPr lang="en-US" dirty="0" smtClean="0"/>
+              <a:t>Cosine Distance – cosine of angle between vectors – ignores magnitude</a:t>
+            </a:r>
+          </a:p>
+          <a:p>
+            <a:pPr lvl="1"/>
+            <a:r>
+              <a:rPr lang="en-US" dirty="0" smtClean="0"/>
+              <a:t>Manhattan distance: Effectively counts the number of square blocks one would “walk” to get there without cutting corners.</a:t>
+            </a:r>
+          </a:p>
+          <a:p>
+            <a:pPr lvl="1"/>
             <a:r>
               <a:rPr lang="en-US" dirty="0" err="1" smtClean="0"/>
-              <a:t>MLLib</a:t>
-            </a:r>
-            <a:endParaRPr lang="en-US" dirty="0"/>
-          </a:p>
-        </p:txBody>
-      </p:sp>
-      <p:sp>
-        <p:nvSpPr>
-          <p:cNvPr id="3" name="Content Placeholder 2"/>
-          <p:cNvSpPr>
-            <a:spLocks noGrp="1"/>
-          </p:cNvSpPr>
-          <p:nvPr>
-            <p:ph idx="1"/>
-          </p:nvPr>
-        </p:nvSpPr>
-        <p:spPr/>
-        <p:txBody>
-          <a:bodyPr/>
-          <a:lstStyle/>
-          <a:p>
-            <a:r>
-              <a:rPr lang="en-US" dirty="0" err="1" smtClean="0"/>
-              <a:t>MLLib</a:t>
-            </a:r>
-            <a:r>
-              <a:rPr lang="en-US" dirty="0" smtClean="0"/>
-              <a:t> has </a:t>
-            </a:r>
-            <a:r>
-              <a:rPr lang="en-US" dirty="0" smtClean="0"/>
-              <a:t>a built-in function called </a:t>
-            </a:r>
-            <a:r>
-              <a:rPr lang="en-US" dirty="0" err="1" smtClean="0"/>
-              <a:t>kmeans</a:t>
-            </a:r>
-            <a:r>
-              <a:rPr lang="en-US" dirty="0" smtClean="0"/>
-              <a:t>, which performs the k-means clustering.</a:t>
-            </a:r>
-          </a:p>
-          <a:p>
-            <a:r>
-              <a:rPr lang="en-US" dirty="0" smtClean="0"/>
-              <a:t>Default values: just provide </a:t>
-            </a:r>
-            <a:r>
-              <a:rPr lang="en-US" dirty="0" err="1" smtClean="0"/>
-              <a:t>kmeans</a:t>
-            </a:r>
-            <a:r>
-              <a:rPr lang="en-US" dirty="0" smtClean="0"/>
-              <a:t>(</a:t>
-            </a:r>
-            <a:r>
-              <a:rPr lang="en-US" dirty="0" err="1" smtClean="0"/>
-              <a:t>df</a:t>
-            </a:r>
-            <a:r>
-              <a:rPr lang="en-US" dirty="0" smtClean="0"/>
-              <a:t>, value-of-k)</a:t>
-            </a:r>
-          </a:p>
-          <a:p>
-            <a:endParaRPr lang="en-US" dirty="0"/>
-          </a:p>
-          <a:p>
-            <a:r>
-              <a:rPr lang="en-US" dirty="0" smtClean="0"/>
-              <a:t>Lab : </a:t>
-            </a:r>
-            <a:r>
-              <a:rPr lang="en-US" dirty="0" err="1" smtClean="0"/>
-              <a:t>kmeans-mtcars.scala</a:t>
-            </a:r>
-            <a:endParaRPr lang="en-US" dirty="0" smtClean="0"/>
-          </a:p>
-          <a:p>
-            <a:pPr>
-              <a:buNone/>
-            </a:pPr>
-            <a:endParaRPr lang="en-US" dirty="0" smtClean="0"/>
+              <a:t>Tanimoto</a:t>
+            </a:r>
+            <a:r>
+              <a:rPr lang="en-US" dirty="0" smtClean="0"/>
+              <a:t> distance  Take both angle and magnitude into account.</a:t>
+            </a:r>
+          </a:p>
+          <a:p>
+            <a:r>
+              <a:rPr lang="en-US" dirty="0" smtClean="0"/>
+              <a:t>Most algorithms attempt to balance the</a:t>
+            </a:r>
+          </a:p>
+          <a:p>
+            <a:pPr lvl="1"/>
+            <a:r>
+              <a:rPr lang="en-US" dirty="0" smtClean="0"/>
+              <a:t>Magnitude</a:t>
+            </a:r>
+          </a:p>
+          <a:p>
+            <a:pPr lvl="1"/>
+            <a:r>
+              <a:rPr lang="en-US" dirty="0" smtClean="0"/>
+              <a:t>Angle</a:t>
+            </a:r>
           </a:p>
           <a:p>
             <a:pPr lvl="1"/>
@@ -10638,7 +10515,7 @@
     </p:spTree>
     <p:extLst>
       <p:ext uri="{BB962C8B-B14F-4D97-AF65-F5344CB8AC3E}">
-        <p14:creationId xmlns:p14="http://schemas.microsoft.com/office/powerpoint/2010/main" xmlns="" val="1791294177"/>
+        <p14:creationId xmlns:p14="http://schemas.microsoft.com/office/powerpoint/2010/main" xmlns="" val="3017253226"/>
       </p:ext>
     </p:extLst>
   </p:cSld>
@@ -10689,7 +10566,7 @@
           <a:p>
             <a:r>
               <a:rPr lang="en-US" dirty="0" smtClean="0"/>
-              <a:t>Next : Recommendations</a:t>
+              <a:t>K-Means Clustering Summary</a:t>
             </a:r>
             <a:endParaRPr lang="en-US" dirty="0"/>
           </a:p>
@@ -10710,7 +10587,63 @@
           <a:bodyPr/>
           <a:lstStyle/>
           <a:p>
-            <a:endParaRPr lang="en-US"/>
+            <a:r>
+              <a:rPr lang="en-US" dirty="0" smtClean="0"/>
+              <a:t>K-Means is simple</a:t>
+            </a:r>
+          </a:p>
+          <a:p>
+            <a:pPr lvl="1"/>
+            <a:r>
+              <a:rPr lang="en-US" dirty="0" smtClean="0"/>
+              <a:t>Well-Understood.</a:t>
+            </a:r>
+          </a:p>
+          <a:p>
+            <a:r>
+              <a:rPr lang="en-US" dirty="0" smtClean="0"/>
+              <a:t>Disadvantages are that:</a:t>
+            </a:r>
+          </a:p>
+          <a:p>
+            <a:pPr lvl="1"/>
+            <a:r>
+              <a:rPr lang="en-US" dirty="0" smtClean="0"/>
+              <a:t>Value of k must be known in advance – which may mean running the exercise many times to get optimum results.</a:t>
+            </a:r>
+          </a:p>
+          <a:p>
+            <a:pPr lvl="1"/>
+            <a:r>
+              <a:rPr lang="en-US" dirty="0" smtClean="0"/>
+              <a:t>Initial </a:t>
+            </a:r>
+            <a:r>
+              <a:rPr lang="en-US" dirty="0" err="1" smtClean="0"/>
+              <a:t>centroid</a:t>
+            </a:r>
+            <a:r>
+              <a:rPr lang="en-US" dirty="0" smtClean="0"/>
+              <a:t> positions are important; may cause long convergence.</a:t>
+            </a:r>
+          </a:p>
+          <a:p>
+            <a:pPr lvl="1"/>
+            <a:r>
+              <a:rPr lang="en-US" dirty="0" smtClean="0"/>
+              <a:t>Dense groupings of points are not especially considered</a:t>
+            </a:r>
+          </a:p>
+          <a:p>
+            <a:pPr lvl="2"/>
+            <a:r>
+              <a:rPr lang="en-US" dirty="0" smtClean="0"/>
+              <a:t>Outliers may bias results.</a:t>
+            </a:r>
+          </a:p>
+          <a:p>
+            <a:pPr lvl="1"/>
+            <a:endParaRPr lang="en-US" dirty="0" smtClean="0"/>
           </a:p>
         </p:txBody>
       </p:sp>
@@ -10764,7 +10697,7 @@
     </p:spTree>
     <p:extLst>
       <p:ext uri="{BB962C8B-B14F-4D97-AF65-F5344CB8AC3E}">
-        <p14:creationId xmlns:p14="http://schemas.microsoft.com/office/powerpoint/2010/main" xmlns="" val="1934961268"/>
+        <p14:creationId xmlns:p14="http://schemas.microsoft.com/office/powerpoint/2010/main" xmlns="" val="1791869827"/>
       </p:ext>
     </p:extLst>
   </p:cSld>
@@ -10815,40 +10748,99 @@
           <a:p>
             <a:r>
               <a:rPr lang="en-US" dirty="0" smtClean="0"/>
-              <a:t>Recommendations Are Every Where : Amazon</a:t>
+              <a:t>K-Means in </a:t>
+            </a:r>
+            <a:r>
+              <a:rPr lang="en-US" dirty="0" err="1" smtClean="0"/>
+              <a:t>MLLib</a:t>
             </a:r>
             <a:endParaRPr lang="en-US" dirty="0"/>
           </a:p>
         </p:txBody>
       </p:sp>
-      <p:pic>
-        <p:nvPicPr>
-          <p:cNvPr id="5" name="Content Placeholder 4" descr="Screen Shot 2014-06-17 at 11.11.05 PM.png"/>
-          <p:cNvPicPr>
-            <a:picLocks noGrp="1" noChangeAspect="1"/>
-          </p:cNvPicPr>
+      <p:sp>
+        <p:nvSpPr>
+          <p:cNvPr id="3" name="Content Placeholder 2"/>
+          <p:cNvSpPr>
+            <a:spLocks noGrp="1"/>
+          </p:cNvSpPr>
           <p:nvPr>
             <p:ph idx="1"/>
           </p:nvPr>
-        </p:nvPicPr>
-        <p:blipFill>
-          <a:blip r:embed="rId2">
-            <a:extLst>
-              <a:ext uri="{28A0092B-C50C-407E-A947-70E740481C1C}">
-                <a14:useLocalDpi xmlns:a14="http://schemas.microsoft.com/office/drawing/2010/main" xmlns="" val="0"/>
-              </a:ext>
-            </a:extLst>
-          </a:blip>
-          <a:srcRect t="-8666" b="-8666"/>
-          <a:stretch>
-            <a:fillRect/>
-          </a:stretch>
-        </p:blipFill>
-        <p:spPr/>
-      </p:pic>
-      <p:sp>
-        <p:nvSpPr>
-          <p:cNvPr id="3" name="Footer Placeholder 2"/>
+        </p:nvSpPr>
+        <p:spPr/>
+        <p:txBody>
+          <a:bodyPr/>
+          <a:lstStyle/>
+          <a:p>
+            <a:r>
+              <a:rPr lang="en-US" dirty="0" err="1" smtClean="0"/>
+              <a:t>MLLib</a:t>
+            </a:r>
+            <a:r>
+              <a:rPr lang="en-US" dirty="0" smtClean="0"/>
+              <a:t> has a built-in function called </a:t>
+            </a:r>
+            <a:r>
+              <a:rPr lang="en-US" dirty="0" err="1" smtClean="0"/>
+              <a:t>kmeans</a:t>
+            </a:r>
+            <a:r>
+              <a:rPr lang="en-US" dirty="0" smtClean="0"/>
+              <a:t>, which performs the k-means clustering.</a:t>
+            </a:r>
+          </a:p>
+          <a:p>
+            <a:r>
+              <a:rPr lang="en-US" dirty="0" smtClean="0"/>
+              <a:t>Default values: just provide </a:t>
+            </a:r>
+            <a:r>
+              <a:rPr lang="en-US" dirty="0" err="1" smtClean="0"/>
+              <a:t>kmeans</a:t>
+            </a:r>
+            <a:r>
+              <a:rPr lang="en-US" dirty="0" smtClean="0"/>
+              <a:t>(</a:t>
+            </a:r>
+            <a:r>
+              <a:rPr lang="en-US" dirty="0" err="1" smtClean="0"/>
+              <a:t>df</a:t>
+            </a:r>
+            <a:r>
+              <a:rPr lang="en-US" dirty="0" smtClean="0"/>
+              <a:t>, value-of-k)</a:t>
+            </a:r>
+          </a:p>
+          <a:p>
+            <a:endParaRPr lang="en-US" dirty="0"/>
+          </a:p>
+          <a:p>
+            <a:r>
+              <a:rPr lang="en-US" dirty="0" smtClean="0"/>
+              <a:t>Lab : </a:t>
+            </a:r>
+            <a:r>
+              <a:rPr lang="en-US" dirty="0" err="1" smtClean="0"/>
+              <a:t>kmeans-mtcars.scala</a:t>
+            </a:r>
+            <a:endParaRPr lang="en-US" dirty="0" smtClean="0"/>
+          </a:p>
+          <a:p>
+            <a:pPr>
+              <a:buNone/>
+            </a:pPr>
+            <a:endParaRPr lang="en-US" dirty="0" smtClean="0"/>
+          </a:p>
+          <a:p>
+            <a:pPr lvl="1"/>
+            <a:endParaRPr lang="en-US" dirty="0" smtClean="0"/>
+          </a:p>
+        </p:txBody>
+      </p:sp>
+      <p:sp>
+        <p:nvSpPr>
+          <p:cNvPr id="4" name="Footer Placeholder 3"/>
           <p:cNvSpPr>
             <a:spLocks noGrp="1"/>
           </p:cNvSpPr>
@@ -10871,7 +10863,7 @@
       </p:sp>
       <p:sp>
         <p:nvSpPr>
-          <p:cNvPr id="4" name="Slide Number Placeholder 3"/>
+          <p:cNvPr id="5" name="Slide Number Placeholder 4"/>
           <p:cNvSpPr>
             <a:spLocks noGrp="1"/>
           </p:cNvSpPr>
@@ -10896,7 +10888,7 @@
     </p:spTree>
     <p:extLst>
       <p:ext uri="{BB962C8B-B14F-4D97-AF65-F5344CB8AC3E}">
-        <p14:creationId xmlns:p14="http://schemas.microsoft.com/office/powerpoint/2010/main" xmlns="" val="3618916858"/>
+        <p14:creationId xmlns:p14="http://schemas.microsoft.com/office/powerpoint/2010/main" xmlns="" val="1791294177"/>
       </p:ext>
     </p:extLst>
   </p:cSld>
@@ -10930,30 +10922,6 @@
           <a:chExt cx="0" cy="0"/>
         </a:xfrm>
       </p:grpSpPr>
-      <p:pic>
-        <p:nvPicPr>
-          <p:cNvPr id="9" name="Picture 8"/>
-          <p:cNvPicPr>
-            <a:picLocks noChangeAspect="1"/>
-          </p:cNvPicPr>
-          <p:nvPr/>
-        </p:nvPicPr>
-        <p:blipFill>
-          <a:blip r:embed="rId2"/>
-          <a:stretch>
-            <a:fillRect/>
-          </a:stretch>
-        </p:blipFill>
-        <p:spPr>
-          <a:xfrm>
-            <a:off x="2749258" y="3776524"/>
-            <a:ext cx="3390900" cy="2540000"/>
-          </a:xfrm>
-          <a:prstGeom prst="rect">
-            <a:avLst/>
-          </a:prstGeom>
-        </p:spPr>
-      </p:pic>
       <p:sp>
         <p:nvSpPr>
           <p:cNvPr id="2" name="Title 1"/>
@@ -10971,7 +10939,7 @@
           <a:p>
             <a:r>
               <a:rPr lang="en-US" dirty="0" smtClean="0"/>
-              <a:t>Recommended : Amazon Prime</a:t>
+              <a:t>Clustering Lab</a:t>
             </a:r>
             <a:endParaRPr lang="en-US" dirty="0"/>
           </a:p>
@@ -10993,109 +10961,41 @@
           <a:lstStyle/>
           <a:p>
             <a:r>
-              <a:rPr lang="en-US" dirty="0" smtClean="0"/>
-              <a:t> </a:t>
-            </a:r>
-            <a:endParaRPr lang="en-US" dirty="0"/>
-          </a:p>
-        </p:txBody>
-      </p:sp>
-      <p:pic>
-        <p:nvPicPr>
-          <p:cNvPr id="5" name="Picture 4"/>
-          <p:cNvPicPr>
-            <a:picLocks noChangeAspect="1"/>
-          </p:cNvPicPr>
-          <p:nvPr/>
-        </p:nvPicPr>
-        <p:blipFill>
-          <a:blip r:embed="rId3"/>
-          <a:stretch>
-            <a:fillRect/>
-          </a:stretch>
-        </p:blipFill>
-        <p:spPr>
-          <a:xfrm>
-            <a:off x="5055707" y="1691716"/>
-            <a:ext cx="2915218" cy="2183684"/>
-          </a:xfrm>
-          <a:prstGeom prst="rect">
-            <a:avLst/>
-          </a:prstGeom>
-        </p:spPr>
-      </p:pic>
-      <p:pic>
-        <p:nvPicPr>
-          <p:cNvPr id="6" name="Picture 5"/>
-          <p:cNvPicPr>
-            <a:picLocks noChangeAspect="1"/>
-          </p:cNvPicPr>
-          <p:nvPr/>
-        </p:nvPicPr>
-        <p:blipFill>
-          <a:blip r:embed="rId4"/>
-          <a:stretch>
-            <a:fillRect/>
-          </a:stretch>
-        </p:blipFill>
-        <p:spPr>
-          <a:xfrm>
-            <a:off x="6229779" y="4375496"/>
-            <a:ext cx="2583133" cy="1934931"/>
-          </a:xfrm>
-          <a:prstGeom prst="rect">
-            <a:avLst/>
-          </a:prstGeom>
-        </p:spPr>
-      </p:pic>
-      <p:pic>
-        <p:nvPicPr>
-          <p:cNvPr id="7" name="Picture 6"/>
-          <p:cNvPicPr>
-            <a:picLocks noChangeAspect="1"/>
-          </p:cNvPicPr>
-          <p:nvPr/>
-        </p:nvPicPr>
-        <p:blipFill>
-          <a:blip r:embed="rId5"/>
-          <a:stretch>
-            <a:fillRect/>
-          </a:stretch>
-        </p:blipFill>
-        <p:spPr>
-          <a:xfrm>
-            <a:off x="144440" y="4513537"/>
-            <a:ext cx="2726898" cy="2042620"/>
-          </a:xfrm>
-          <a:prstGeom prst="rect">
-            <a:avLst/>
-          </a:prstGeom>
-        </p:spPr>
-      </p:pic>
-      <p:pic>
-        <p:nvPicPr>
-          <p:cNvPr id="8" name="Picture 7"/>
-          <p:cNvPicPr>
-            <a:picLocks noChangeAspect="1"/>
-          </p:cNvPicPr>
-          <p:nvPr/>
-        </p:nvPicPr>
-        <p:blipFill>
-          <a:blip r:embed="rId6"/>
-          <a:stretch>
-            <a:fillRect/>
-          </a:stretch>
-        </p:blipFill>
-        <p:spPr>
-          <a:xfrm>
-            <a:off x="162642" y="1835496"/>
-            <a:ext cx="3390900" cy="2540000"/>
-          </a:xfrm>
-          <a:prstGeom prst="rect">
-            <a:avLst/>
-          </a:prstGeom>
-        </p:spPr>
-      </p:pic>
+              <a:rPr lang="en-US" dirty="0" err="1" smtClean="0"/>
+              <a:t>Mtcars</a:t>
+            </a:r>
+            <a:r>
+              <a:rPr lang="en-US" dirty="0" smtClean="0"/>
+              <a:t> dataset: data about car models.</a:t>
+            </a:r>
+          </a:p>
+          <a:p>
+            <a:r>
+              <a:rPr lang="en-US" dirty="0" smtClean="0"/>
+              <a:t>location   : </a:t>
+            </a:r>
+            <a:r>
+              <a:rPr lang="en-US" dirty="0" err="1" smtClean="0"/>
+              <a:t>mllib</a:t>
+            </a:r>
+            <a:r>
+              <a:rPr lang="en-US" dirty="0" smtClean="0"/>
+              <a:t>/</a:t>
+            </a:r>
+            <a:r>
+              <a:rPr lang="en-US" dirty="0" err="1" smtClean="0"/>
+              <a:t>kmeans</a:t>
+            </a:r>
+            <a:endParaRPr lang="en-US" dirty="0" smtClean="0"/>
+          </a:p>
+          <a:p>
+            <a:r>
+              <a:rPr lang="en-US" dirty="0" smtClean="0"/>
+              <a:t>Try out the solution line-by-line</a:t>
+            </a:r>
+          </a:p>
+        </p:txBody>
+      </p:sp>
       <p:sp>
         <p:nvSpPr>
           <p:cNvPr id="4" name="Footer Placeholder 3"/>
@@ -11121,7 +11021,7 @@
       </p:sp>
       <p:sp>
         <p:nvSpPr>
-          <p:cNvPr id="10" name="Slide Number Placeholder 9"/>
+          <p:cNvPr id="5" name="Slide Number Placeholder 4"/>
           <p:cNvSpPr>
             <a:spLocks noGrp="1"/>
           </p:cNvSpPr>
@@ -11146,7 +11046,7 @@
     </p:spTree>
     <p:extLst>
       <p:ext uri="{BB962C8B-B14F-4D97-AF65-F5344CB8AC3E}">
-        <p14:creationId xmlns:p14="http://schemas.microsoft.com/office/powerpoint/2010/main" xmlns="" val="3527473027"/>
+        <p14:creationId xmlns:p14="http://schemas.microsoft.com/office/powerpoint/2010/main" xmlns="" val="3599210062"/>
       </p:ext>
     </p:extLst>
   </p:cSld>
@@ -12103,40 +12003,34 @@
           <a:p>
             <a:r>
               <a:rPr lang="en-US" dirty="0" smtClean="0"/>
-              <a:t>Recommendations From Netflix (With Profiles)</a:t>
+              <a:t>Next : Recommendations</a:t>
             </a:r>
             <a:endParaRPr lang="en-US" dirty="0"/>
           </a:p>
         </p:txBody>
       </p:sp>
-      <p:pic>
-        <p:nvPicPr>
-          <p:cNvPr id="4" name="Content Placeholder 3" descr="Screen Shot 2014-06-17 at 11.14.01 PM.png"/>
-          <p:cNvPicPr>
-            <a:picLocks noGrp="1" noChangeAspect="1"/>
-          </p:cNvPicPr>
+      <p:sp>
+        <p:nvSpPr>
+          <p:cNvPr id="3" name="Content Placeholder 2"/>
+          <p:cNvSpPr>
+            <a:spLocks noGrp="1"/>
+          </p:cNvSpPr>
           <p:nvPr>
             <p:ph idx="1"/>
           </p:nvPr>
-        </p:nvPicPr>
-        <p:blipFill>
-          <a:blip r:embed="rId2">
-            <a:extLst>
-              <a:ext uri="{28A0092B-C50C-407E-A947-70E740481C1C}">
-                <a14:useLocalDpi xmlns:a14="http://schemas.microsoft.com/office/drawing/2010/main" xmlns="" val="0"/>
-              </a:ext>
-            </a:extLst>
-          </a:blip>
-          <a:srcRect t="-736" b="-736"/>
-          <a:stretch>
-            <a:fillRect/>
-          </a:stretch>
-        </p:blipFill>
-        <p:spPr/>
-      </p:pic>
-      <p:sp>
-        <p:nvSpPr>
-          <p:cNvPr id="3" name="Footer Placeholder 2"/>
+        </p:nvSpPr>
+        <p:spPr/>
+        <p:txBody>
+          <a:bodyPr/>
+          <a:lstStyle/>
+          <a:p>
+            <a:endParaRPr lang="en-US"/>
+          </a:p>
+        </p:txBody>
+      </p:sp>
+      <p:sp>
+        <p:nvSpPr>
+          <p:cNvPr id="4" name="Footer Placeholder 3"/>
           <p:cNvSpPr>
             <a:spLocks noGrp="1"/>
           </p:cNvSpPr>
@@ -12184,7 +12078,7 @@
     </p:spTree>
     <p:extLst>
       <p:ext uri="{BB962C8B-B14F-4D97-AF65-F5344CB8AC3E}">
-        <p14:creationId xmlns:p14="http://schemas.microsoft.com/office/powerpoint/2010/main" xmlns="" val="3992340815"/>
+        <p14:creationId xmlns:p14="http://schemas.microsoft.com/office/powerpoint/2010/main" xmlns="" val="1934961268"/>
       </p:ext>
     </p:extLst>
   </p:cSld>
@@ -12235,81 +12129,40 @@
           <a:p>
             <a:r>
               <a:rPr lang="en-US" dirty="0" smtClean="0"/>
-              <a:t>Recommendations</a:t>
+              <a:t>Recommendations Are Everywhere : Amazon</a:t>
             </a:r>
             <a:endParaRPr lang="en-US" dirty="0"/>
           </a:p>
         </p:txBody>
       </p:sp>
-      <p:sp>
-        <p:nvSpPr>
-          <p:cNvPr id="3" name="Content Placeholder 2"/>
-          <p:cNvSpPr>
-            <a:spLocks noGrp="1"/>
-          </p:cNvSpPr>
+      <p:pic>
+        <p:nvPicPr>
+          <p:cNvPr id="5" name="Content Placeholder 4" descr="Screen Shot 2014-06-17 at 11.11.05 PM.png"/>
+          <p:cNvPicPr>
+            <a:picLocks noGrp="1" noChangeAspect="1"/>
+          </p:cNvPicPr>
           <p:nvPr>
             <p:ph idx="1"/>
           </p:nvPr>
-        </p:nvSpPr>
-        <p:spPr/>
-        <p:txBody>
-          <a:bodyPr>
-            <a:normAutofit/>
-          </a:bodyPr>
-          <a:lstStyle/>
-          <a:p>
-            <a:r>
-              <a:rPr lang="en-US" dirty="0" smtClean="0"/>
-              <a:t>Recommendations are a straightforward application of the Collaborative Filtering algorithm.</a:t>
-            </a:r>
-          </a:p>
-          <a:p>
-            <a:pPr lvl="1"/>
-            <a:r>
-              <a:rPr lang="en-US" dirty="0" smtClean="0"/>
-              <a:t>Collaborative filtering relates set A to set B.</a:t>
-            </a:r>
-          </a:p>
-          <a:p>
-            <a:pPr lvl="1"/>
-            <a:r>
-              <a:rPr lang="en-US" dirty="0" smtClean="0"/>
-              <a:t>Variables in set A are given a similarity metric based on expressed relations with set B.</a:t>
-            </a:r>
-          </a:p>
-          <a:p>
-            <a:pPr lvl="1"/>
-            <a:r>
-              <a:rPr lang="en-US" dirty="0" smtClean="0"/>
-              <a:t>We can then make guess that relations between individual members of set A can be predicted by those similar.</a:t>
-            </a:r>
-          </a:p>
-          <a:p>
-            <a:r>
-              <a:rPr lang="en-US" dirty="0" smtClean="0"/>
-              <a:t>Recommendations</a:t>
-            </a:r>
-          </a:p>
-          <a:p>
-            <a:pPr lvl="1"/>
-            <a:r>
-              <a:rPr lang="en-US" dirty="0" smtClean="0"/>
-              <a:t>Let’s call set A: users and set B: items (as this is the most obvious application of CF.</a:t>
-            </a:r>
-            <a:endParaRPr lang="en-US" dirty="0"/>
-          </a:p>
-          <a:p>
-            <a:pPr lvl="1"/>
-            <a:r>
-              <a:rPr lang="en-US" dirty="0" smtClean="0"/>
-              <a:t>We recommend items to users based on users’ expressed preferences.</a:t>
-            </a:r>
-          </a:p>
-        </p:txBody>
-      </p:sp>
-      <p:sp>
-        <p:nvSpPr>
-          <p:cNvPr id="4" name="Footer Placeholder 3"/>
+        </p:nvPicPr>
+        <p:blipFill>
+          <a:blip r:embed="rId2">
+            <a:extLst>
+              <a:ext uri="{28A0092B-C50C-407E-A947-70E740481C1C}">
+                <a14:useLocalDpi xmlns:a14="http://schemas.microsoft.com/office/drawing/2010/main" xmlns="" val="0"/>
+              </a:ext>
+            </a:extLst>
+          </a:blip>
+          <a:srcRect t="-8666" b="-8666"/>
+          <a:stretch>
+            <a:fillRect/>
+          </a:stretch>
+        </p:blipFill>
+        <p:spPr/>
+      </p:pic>
+      <p:sp>
+        <p:nvSpPr>
+          <p:cNvPr id="3" name="Footer Placeholder 2"/>
           <p:cNvSpPr>
             <a:spLocks noGrp="1"/>
           </p:cNvSpPr>
@@ -12332,7 +12185,7 @@
       </p:sp>
       <p:sp>
         <p:nvSpPr>
-          <p:cNvPr id="5" name="Slide Number Placeholder 4"/>
+          <p:cNvPr id="4" name="Slide Number Placeholder 3"/>
           <p:cNvSpPr>
             <a:spLocks noGrp="1"/>
           </p:cNvSpPr>
@@ -12357,7 +12210,7 @@
     </p:spTree>
     <p:extLst>
       <p:ext uri="{BB962C8B-B14F-4D97-AF65-F5344CB8AC3E}">
-        <p14:creationId xmlns:p14="http://schemas.microsoft.com/office/powerpoint/2010/main" xmlns="" val="2174042868"/>
+        <p14:creationId xmlns:p14="http://schemas.microsoft.com/office/powerpoint/2010/main" xmlns="" val="3618916858"/>
       </p:ext>
     </p:extLst>
   </p:cSld>
@@ -12391,6 +12244,30 @@
           <a:chExt cx="0" cy="0"/>
         </a:xfrm>
       </p:grpSpPr>
+      <p:pic>
+        <p:nvPicPr>
+          <p:cNvPr id="9" name="Picture 8"/>
+          <p:cNvPicPr>
+            <a:picLocks noChangeAspect="1"/>
+          </p:cNvPicPr>
+          <p:nvPr/>
+        </p:nvPicPr>
+        <p:blipFill>
+          <a:blip r:embed="rId2"/>
+          <a:stretch>
+            <a:fillRect/>
+          </a:stretch>
+        </p:blipFill>
+        <p:spPr>
+          <a:xfrm>
+            <a:off x="2749258" y="3776524"/>
+            <a:ext cx="3390900" cy="2540000"/>
+          </a:xfrm>
+          <a:prstGeom prst="rect">
+            <a:avLst/>
+          </a:prstGeom>
+        </p:spPr>
+      </p:pic>
       <p:sp>
         <p:nvSpPr>
           <p:cNvPr id="2" name="Title 1"/>
@@ -12408,7 +12285,7 @@
           <a:p>
             <a:r>
               <a:rPr lang="en-US" dirty="0" smtClean="0"/>
-              <a:t>Collaborative Filtering</a:t>
+              <a:t>Recommended : Amazon Prime</a:t>
             </a:r>
             <a:endParaRPr lang="en-US" dirty="0"/>
           </a:p>
@@ -12431,35 +12308,108 @@
           <a:p>
             <a:r>
               <a:rPr lang="en-US" dirty="0" smtClean="0"/>
-              <a:t>Collaborative Filtering (CF) is commonly used in Recommendations “Recommended For You” or “More Like This” functionality</a:t>
-            </a:r>
-          </a:p>
-          <a:p>
-            <a:r>
-              <a:rPr lang="en-US" dirty="0" smtClean="0"/>
-              <a:t>Recommendations can be explicit (based on user ratings), or implicit (based on user interest)</a:t>
-            </a:r>
-          </a:p>
-          <a:p>
-            <a:r>
-              <a:rPr lang="en-US" dirty="0" smtClean="0"/>
-              <a:t>CF usually involves concepts of Users and Items, with users expressing some preference for items.  However, it need NOT actually be users and items; it could be any kind of association in which between one set of data and another.</a:t>
-            </a:r>
-          </a:p>
-          <a:p>
-            <a:r>
-              <a:rPr lang="en-US" dirty="0" smtClean="0"/>
-              <a:t>Users and Items could be the same (example: dating site)</a:t>
-            </a:r>
-          </a:p>
-          <a:p>
-            <a:endParaRPr lang="en-US" dirty="0" smtClean="0"/>
-          </a:p>
-          <a:p>
+              <a:t> </a:t>
+            </a:r>
             <a:endParaRPr lang="en-US" dirty="0"/>
           </a:p>
         </p:txBody>
       </p:sp>
+      <p:pic>
+        <p:nvPicPr>
+          <p:cNvPr id="5" name="Picture 4"/>
+          <p:cNvPicPr>
+            <a:picLocks noChangeAspect="1"/>
+          </p:cNvPicPr>
+          <p:nvPr/>
+        </p:nvPicPr>
+        <p:blipFill>
+          <a:blip r:embed="rId3"/>
+          <a:stretch>
+            <a:fillRect/>
+          </a:stretch>
+        </p:blipFill>
+        <p:spPr>
+          <a:xfrm>
+            <a:off x="5055707" y="1691716"/>
+            <a:ext cx="2915218" cy="2183684"/>
+          </a:xfrm>
+          <a:prstGeom prst="rect">
+            <a:avLst/>
+          </a:prstGeom>
+        </p:spPr>
+      </p:pic>
+      <p:pic>
+        <p:nvPicPr>
+          <p:cNvPr id="6" name="Picture 5"/>
+          <p:cNvPicPr>
+            <a:picLocks noChangeAspect="1"/>
+          </p:cNvPicPr>
+          <p:nvPr/>
+        </p:nvPicPr>
+        <p:blipFill>
+          <a:blip r:embed="rId4"/>
+          <a:stretch>
+            <a:fillRect/>
+          </a:stretch>
+        </p:blipFill>
+        <p:spPr>
+          <a:xfrm>
+            <a:off x="6229779" y="4375496"/>
+            <a:ext cx="2583133" cy="1934931"/>
+          </a:xfrm>
+          <a:prstGeom prst="rect">
+            <a:avLst/>
+          </a:prstGeom>
+        </p:spPr>
+      </p:pic>
+      <p:pic>
+        <p:nvPicPr>
+          <p:cNvPr id="7" name="Picture 6"/>
+          <p:cNvPicPr>
+            <a:picLocks noChangeAspect="1"/>
+          </p:cNvPicPr>
+          <p:nvPr/>
+        </p:nvPicPr>
+        <p:blipFill>
+          <a:blip r:embed="rId5"/>
+          <a:stretch>
+            <a:fillRect/>
+          </a:stretch>
+        </p:blipFill>
+        <p:spPr>
+          <a:xfrm>
+            <a:off x="144440" y="4513537"/>
+            <a:ext cx="2726898" cy="2042620"/>
+          </a:xfrm>
+          <a:prstGeom prst="rect">
+            <a:avLst/>
+          </a:prstGeom>
+        </p:spPr>
+      </p:pic>
+      <p:pic>
+        <p:nvPicPr>
+          <p:cNvPr id="8" name="Picture 7"/>
+          <p:cNvPicPr>
+            <a:picLocks noChangeAspect="1"/>
+          </p:cNvPicPr>
+          <p:nvPr/>
+        </p:nvPicPr>
+        <p:blipFill>
+          <a:blip r:embed="rId6"/>
+          <a:stretch>
+            <a:fillRect/>
+          </a:stretch>
+        </p:blipFill>
+        <p:spPr>
+          <a:xfrm>
+            <a:off x="162642" y="1835496"/>
+            <a:ext cx="3390900" cy="2540000"/>
+          </a:xfrm>
+          <a:prstGeom prst="rect">
+            <a:avLst/>
+          </a:prstGeom>
+        </p:spPr>
+      </p:pic>
       <p:sp>
         <p:nvSpPr>
           <p:cNvPr id="4" name="Footer Placeholder 3"/>
@@ -12485,7 +12435,7 @@
       </p:sp>
       <p:sp>
         <p:nvSpPr>
-          <p:cNvPr id="5" name="Slide Number Placeholder 4"/>
+          <p:cNvPr id="10" name="Slide Number Placeholder 9"/>
           <p:cNvSpPr>
             <a:spLocks noGrp="1"/>
           </p:cNvSpPr>
@@ -12510,7 +12460,7 @@
     </p:spTree>
     <p:extLst>
       <p:ext uri="{BB962C8B-B14F-4D97-AF65-F5344CB8AC3E}">
-        <p14:creationId xmlns:p14="http://schemas.microsoft.com/office/powerpoint/2010/main" xmlns="" val="376185666"/>
+        <p14:creationId xmlns:p14="http://schemas.microsoft.com/office/powerpoint/2010/main" xmlns="" val="3527473027"/>
       </p:ext>
     </p:extLst>
   </p:cSld>
@@ -12561,7 +12511,7 @@
           <a:p>
             <a:r>
               <a:rPr lang="en-US" dirty="0" smtClean="0"/>
-              <a:t>Ratings Matrix : Users / Movies</a:t>
+              <a:t>Recommendations From Netflix (With Profiles)</a:t>
             </a:r>
             <a:endParaRPr lang="en-US" dirty="0"/>
           </a:p>
@@ -12569,7 +12519,7 @@
       </p:sp>
       <p:pic>
         <p:nvPicPr>
-          <p:cNvPr id="4" name="Content Placeholder 3" descr="Screen Shot 2014-06-17 at 11.20.02 PM.png"/>
+          <p:cNvPr id="4" name="Content Placeholder 3" descr="Screen Shot 2014-06-17 at 11.14.01 PM.png"/>
           <p:cNvPicPr>
             <a:picLocks noGrp="1" noChangeAspect="1"/>
           </p:cNvPicPr>
@@ -12585,7 +12535,7 @@
               </a:ext>
             </a:extLst>
           </a:blip>
-          <a:srcRect t="-13879" b="-13879"/>
+          <a:srcRect t="-736" b="-736"/>
           <a:stretch>
             <a:fillRect/>
           </a:stretch>
@@ -12642,7 +12592,7 @@
     </p:spTree>
     <p:extLst>
       <p:ext uri="{BB962C8B-B14F-4D97-AF65-F5344CB8AC3E}">
-        <p14:creationId xmlns:p14="http://schemas.microsoft.com/office/powerpoint/2010/main" xmlns="" val="3658327973"/>
+        <p14:creationId xmlns:p14="http://schemas.microsoft.com/office/powerpoint/2010/main" xmlns="" val="3992340815"/>
       </p:ext>
     </p:extLst>
   </p:cSld>
@@ -12693,40 +12643,81 @@
           <a:p>
             <a:r>
               <a:rPr lang="en-US" dirty="0" smtClean="0"/>
-              <a:t>Item Ratings Matrix</a:t>
+              <a:t>Recommendations</a:t>
             </a:r>
             <a:endParaRPr lang="en-US" dirty="0"/>
           </a:p>
         </p:txBody>
       </p:sp>
-      <p:pic>
-        <p:nvPicPr>
-          <p:cNvPr id="4" name="Content Placeholder 3" descr="Screen Shot 2014-06-17 at 11.29.51 PM.png"/>
-          <p:cNvPicPr>
-            <a:picLocks noGrp="1" noChangeAspect="1"/>
-          </p:cNvPicPr>
+      <p:sp>
+        <p:nvSpPr>
+          <p:cNvPr id="3" name="Content Placeholder 2"/>
+          <p:cNvSpPr>
+            <a:spLocks noGrp="1"/>
+          </p:cNvSpPr>
           <p:nvPr>
             <p:ph idx="1"/>
           </p:nvPr>
-        </p:nvPicPr>
-        <p:blipFill>
-          <a:blip r:embed="rId2">
-            <a:extLst>
-              <a:ext uri="{28A0092B-C50C-407E-A947-70E740481C1C}">
-                <a14:useLocalDpi xmlns:a14="http://schemas.microsoft.com/office/drawing/2010/main" xmlns="" val="0"/>
-              </a:ext>
-            </a:extLst>
-          </a:blip>
-          <a:srcRect l="-14843" r="-14843"/>
-          <a:stretch>
-            <a:fillRect/>
-          </a:stretch>
-        </p:blipFill>
-        <p:spPr/>
-      </p:pic>
-      <p:sp>
-        <p:nvSpPr>
-          <p:cNvPr id="3" name="Footer Placeholder 2"/>
+        </p:nvSpPr>
+        <p:spPr/>
+        <p:txBody>
+          <a:bodyPr>
+            <a:normAutofit/>
+          </a:bodyPr>
+          <a:lstStyle/>
+          <a:p>
+            <a:r>
+              <a:rPr lang="en-US" dirty="0" smtClean="0"/>
+              <a:t>Recommendations are a straightforward application of the Collaborative Filtering algorithm.</a:t>
+            </a:r>
+          </a:p>
+          <a:p>
+            <a:pPr lvl="1"/>
+            <a:r>
+              <a:rPr lang="en-US" dirty="0" smtClean="0"/>
+              <a:t>Collaborative filtering relates set A to set B.</a:t>
+            </a:r>
+          </a:p>
+          <a:p>
+            <a:pPr lvl="1"/>
+            <a:r>
+              <a:rPr lang="en-US" dirty="0" smtClean="0"/>
+              <a:t>Variables in set A are given a similarity metric based on expressed relations with set B.</a:t>
+            </a:r>
+          </a:p>
+          <a:p>
+            <a:pPr lvl="1"/>
+            <a:r>
+              <a:rPr lang="en-US" dirty="0" smtClean="0"/>
+              <a:t>We can then make guess that relations between individual members of set A can be predicted by those similar.</a:t>
+            </a:r>
+          </a:p>
+          <a:p>
+            <a:r>
+              <a:rPr lang="en-US" dirty="0" smtClean="0"/>
+              <a:t>Recommendations</a:t>
+            </a:r>
+          </a:p>
+          <a:p>
+            <a:pPr lvl="1"/>
+            <a:r>
+              <a:rPr lang="en-US" dirty="0" smtClean="0"/>
+              <a:t>Let’s call set A: users and set B: items (as this is the most obvious application of CF.</a:t>
+            </a:r>
+            <a:endParaRPr lang="en-US" dirty="0"/>
+          </a:p>
+          <a:p>
+            <a:pPr lvl="1"/>
+            <a:r>
+              <a:rPr lang="en-US" dirty="0" smtClean="0"/>
+              <a:t>We recommend items to users based on users’ expressed preferences.</a:t>
+            </a:r>
+          </a:p>
+        </p:txBody>
+      </p:sp>
+      <p:sp>
+        <p:nvSpPr>
+          <p:cNvPr id="4" name="Footer Placeholder 3"/>
           <p:cNvSpPr>
             <a:spLocks noGrp="1"/>
           </p:cNvSpPr>
@@ -12740,10 +12731,10 @@
           <a:lstStyle/>
           <a:p>
             <a:r>
-              <a:rPr lang="en-US" dirty="0" smtClean="0"/>
+              <a:rPr lang="en-US" smtClean="0"/>
               <a:t>(c) ElephantScale.com 2014</a:t>
             </a:r>
-            <a:endParaRPr lang="en-US" dirty="0"/>
+            <a:endParaRPr lang="en-US"/>
           </a:p>
         </p:txBody>
       </p:sp>
@@ -12767,14 +12758,14 @@
               <a:pPr/>
               <a:t>24</a:t>
             </a:fld>
-            <a:endParaRPr lang="en-US" dirty="0"/>
+            <a:endParaRPr lang="en-US"/>
           </a:p>
         </p:txBody>
       </p:sp>
     </p:spTree>
     <p:extLst>
       <p:ext uri="{BB962C8B-B14F-4D97-AF65-F5344CB8AC3E}">
-        <p14:creationId xmlns:p14="http://schemas.microsoft.com/office/powerpoint/2010/main" xmlns="" val="2784375879"/>
+        <p14:creationId xmlns:p14="http://schemas.microsoft.com/office/powerpoint/2010/main" xmlns="" val="2174042868"/>
       </p:ext>
     </p:extLst>
   </p:cSld>
@@ -12824,16 +12815,8 @@
           <a:lstStyle/>
           <a:p>
             <a:r>
-              <a:rPr lang="en-US" dirty="0" err="1" smtClean="0"/>
-              <a:t>MLLib</a:t>
-            </a:r>
-            <a:r>
-              <a:rPr lang="en-US" dirty="0" smtClean="0"/>
-              <a:t> </a:t>
-            </a:r>
-            <a:r>
-              <a:rPr lang="en-US" dirty="0" smtClean="0"/>
-              <a:t>&amp; Recommendations</a:t>
+              <a:rPr lang="en-US" dirty="0" smtClean="0"/>
+              <a:t>Collaborative Filtering</a:t>
             </a:r>
             <a:endParaRPr lang="en-US" dirty="0"/>
           </a:p>
@@ -12856,175 +12839,31 @@
           <a:p>
             <a:r>
               <a:rPr lang="en-US" dirty="0" smtClean="0"/>
-              <a:t>Uses the Recommendations.ALS</a:t>
-            </a:r>
-          </a:p>
-          <a:p>
-            <a:r>
-              <a:rPr lang="en-US" dirty="0" smtClean="0"/>
-              <a:t>ALS = Alternating Least Squares algorithm</a:t>
-            </a:r>
-          </a:p>
-          <a:p>
-            <a:r>
-              <a:rPr lang="en-US" dirty="0" smtClean="0"/>
-              <a:t>Train Model using number of iterations and rank.</a:t>
-            </a:r>
-          </a:p>
-          <a:p>
-            <a:r>
-              <a:rPr lang="en-US" dirty="0" smtClean="0"/>
-              <a:t>Class “Rating”, contains a </a:t>
-            </a:r>
-            <a:r>
-              <a:rPr lang="en-US" dirty="0" err="1" smtClean="0"/>
-              <a:t>UserId</a:t>
-            </a:r>
-            <a:r>
-              <a:rPr lang="en-US" dirty="0" smtClean="0"/>
-              <a:t>, </a:t>
-            </a:r>
-            <a:r>
-              <a:rPr lang="en-US" dirty="0" err="1" smtClean="0"/>
-              <a:t>ItemId</a:t>
-            </a:r>
-            <a:r>
-              <a:rPr lang="en-US" dirty="0" smtClean="0"/>
-              <a:t>, and numeric rating (i.e. 0-5).  </a:t>
-            </a:r>
+              <a:t>Collaborative Filtering (CF) is commonly used in Recommendations “Recommended For You” or “More Like This” functionality</a:t>
+            </a:r>
+          </a:p>
+          <a:p>
+            <a:r>
+              <a:rPr lang="en-US" dirty="0" smtClean="0"/>
+              <a:t>Recommendations can be explicit (based on user ratings), or implicit (based on user interest)</a:t>
+            </a:r>
+          </a:p>
+          <a:p>
+            <a:r>
+              <a:rPr lang="en-US" dirty="0" smtClean="0"/>
+              <a:t>CF usually involves concepts of Users and Items, with users expressing some preference for items.  However, it need NOT actually be users and items; it could be any kind of association in which between one set of data and another.</a:t>
+            </a:r>
+          </a:p>
+          <a:p>
+            <a:r>
+              <a:rPr lang="en-US" dirty="0" smtClean="0"/>
+              <a:t>Users and Items could be the same (example: dating site)</a:t>
+            </a:r>
+          </a:p>
+          <a:p>
             <a:endParaRPr lang="en-US" dirty="0" smtClean="0"/>
           </a:p>
           <a:p>
-            <a:pPr lvl="1"/>
-            <a:r>
-              <a:rPr lang="en-US" b="1" dirty="0" err="1" smtClean="0"/>
-              <a:t>val</a:t>
-            </a:r>
-            <a:r>
-              <a:rPr lang="en-US" dirty="0" smtClean="0"/>
-              <a:t> ratings </a:t>
-            </a:r>
-            <a:r>
-              <a:rPr lang="en-US" b="1" dirty="0" smtClean="0"/>
-              <a:t>=</a:t>
-            </a:r>
-            <a:r>
-              <a:rPr lang="en-US" dirty="0" smtClean="0"/>
-              <a:t> data.map(</a:t>
-            </a:r>
-            <a:r>
-              <a:rPr lang="en-US" b="1" dirty="0" smtClean="0"/>
-              <a:t>_</a:t>
-            </a:r>
-            <a:r>
-              <a:rPr lang="en-US" dirty="0" smtClean="0"/>
-              <a:t>.split(',') </a:t>
-            </a:r>
-            <a:r>
-              <a:rPr lang="en-US" b="1" dirty="0" smtClean="0"/>
-              <a:t>match</a:t>
-            </a:r>
-            <a:r>
-              <a:rPr lang="en-US" dirty="0" smtClean="0"/>
-              <a:t> { </a:t>
-            </a:r>
-            <a:r>
-              <a:rPr lang="en-US" b="1" dirty="0" smtClean="0"/>
-              <a:t>case</a:t>
-            </a:r>
-            <a:r>
-              <a:rPr lang="en-US" dirty="0" smtClean="0"/>
-              <a:t> </a:t>
-            </a:r>
-            <a:r>
-              <a:rPr lang="en-US" b="1" dirty="0" smtClean="0"/>
-              <a:t>Array</a:t>
-            </a:r>
-            <a:r>
-              <a:rPr lang="en-US" dirty="0" smtClean="0"/>
-              <a:t>(user, item, rate) </a:t>
-            </a:r>
-            <a:r>
-              <a:rPr lang="en-US" b="1" dirty="0" smtClean="0"/>
-              <a:t>=&gt;</a:t>
-            </a:r>
-            <a:r>
-              <a:rPr lang="en-US" dirty="0" smtClean="0"/>
-              <a:t> </a:t>
-            </a:r>
-            <a:r>
-              <a:rPr lang="en-US" b="1" dirty="0" smtClean="0"/>
-              <a:t>Rating</a:t>
-            </a:r>
-            <a:r>
-              <a:rPr lang="en-US" dirty="0" smtClean="0"/>
-              <a:t>(</a:t>
-            </a:r>
-            <a:r>
-              <a:rPr lang="en-US" dirty="0" err="1" smtClean="0"/>
-              <a:t>user.toInt</a:t>
-            </a:r>
-            <a:r>
-              <a:rPr lang="en-US" dirty="0" smtClean="0"/>
-              <a:t>, </a:t>
-            </a:r>
-            <a:r>
-              <a:rPr lang="en-US" dirty="0" err="1" smtClean="0"/>
-              <a:t>item.toInt</a:t>
-            </a:r>
-            <a:r>
-              <a:rPr lang="en-US" dirty="0" smtClean="0"/>
-              <a:t>, </a:t>
-            </a:r>
-            <a:r>
-              <a:rPr lang="en-US" dirty="0" err="1" smtClean="0"/>
-              <a:t>rate.toDouble</a:t>
-            </a:r>
-            <a:r>
-              <a:rPr lang="en-US" dirty="0" smtClean="0"/>
-              <a:t>) })</a:t>
-            </a:r>
-            <a:endParaRPr lang="en-US" dirty="0" smtClean="0"/>
-          </a:p>
-          <a:p>
-            <a:r>
-              <a:rPr lang="en-US" dirty="0" smtClean="0"/>
-              <a:t>Train model using training data:</a:t>
-            </a:r>
-          </a:p>
-          <a:p>
-            <a:pPr lvl="1"/>
-            <a:r>
-              <a:rPr lang="sv-SE" b="1" dirty="0" smtClean="0"/>
-              <a:t>val</a:t>
-            </a:r>
-            <a:r>
-              <a:rPr lang="sv-SE" dirty="0" smtClean="0"/>
-              <a:t> model </a:t>
-            </a:r>
-            <a:r>
-              <a:rPr lang="sv-SE" b="1" dirty="0" smtClean="0"/>
-              <a:t>=</a:t>
-            </a:r>
-            <a:r>
-              <a:rPr lang="sv-SE" dirty="0" smtClean="0"/>
-              <a:t> </a:t>
-            </a:r>
-            <a:r>
-              <a:rPr lang="sv-SE" b="1" dirty="0" smtClean="0"/>
-              <a:t>ALS</a:t>
-            </a:r>
-            <a:r>
-              <a:rPr lang="sv-SE" dirty="0" smtClean="0"/>
-              <a:t>.train(ratings, rank, numIterations, 0.01</a:t>
-            </a:r>
-            <a:r>
-              <a:rPr lang="sv-SE" dirty="0" smtClean="0"/>
-              <a:t>)</a:t>
-            </a:r>
-          </a:p>
-          <a:p>
-            <a:pPr lvl="1"/>
             <a:endParaRPr lang="en-US" dirty="0"/>
           </a:p>
         </p:txBody>
@@ -13079,7 +12918,7 @@
     </p:spTree>
     <p:extLst>
       <p:ext uri="{BB962C8B-B14F-4D97-AF65-F5344CB8AC3E}">
-        <p14:creationId xmlns:p14="http://schemas.microsoft.com/office/powerpoint/2010/main" xmlns="" val="1251454248"/>
+        <p14:creationId xmlns:p14="http://schemas.microsoft.com/office/powerpoint/2010/main" xmlns="" val="376185666"/>
       </p:ext>
     </p:extLst>
   </p:cSld>
@@ -13130,67 +12969,40 @@
           <a:p>
             <a:r>
               <a:rPr lang="en-US" dirty="0" smtClean="0"/>
-              <a:t>Recommendations Lab</a:t>
+              <a:t>Ratings Matrix : Users / Movies</a:t>
             </a:r>
             <a:endParaRPr lang="en-US" dirty="0"/>
           </a:p>
         </p:txBody>
       </p:sp>
-      <p:sp>
-        <p:nvSpPr>
-          <p:cNvPr id="3" name="Content Placeholder 2"/>
-          <p:cNvSpPr>
-            <a:spLocks noGrp="1"/>
-          </p:cNvSpPr>
+      <p:pic>
+        <p:nvPicPr>
+          <p:cNvPr id="4" name="Content Placeholder 3" descr="Screen Shot 2014-06-17 at 11.20.02 PM.png"/>
+          <p:cNvPicPr>
+            <a:picLocks noGrp="1" noChangeAspect="1"/>
+          </p:cNvPicPr>
           <p:nvPr>
             <p:ph idx="1"/>
           </p:nvPr>
-        </p:nvSpPr>
-        <p:spPr/>
-        <p:txBody>
-          <a:bodyPr/>
-          <a:lstStyle/>
-          <a:p>
-            <a:r>
-              <a:rPr lang="en-US" dirty="0" smtClean="0"/>
-              <a:t>We will use dat</a:t>
-            </a:r>
-            <a:r>
-              <a:rPr lang="en-US" dirty="0" smtClean="0"/>
-              <a:t>a from a Czech dating website: </a:t>
-            </a:r>
-            <a:r>
-              <a:rPr lang="en-US" dirty="0" err="1" smtClean="0"/>
-              <a:t>libimseti</a:t>
-            </a:r>
-            <a:endParaRPr lang="en-US" dirty="0" smtClean="0"/>
-          </a:p>
-          <a:p>
-            <a:r>
-              <a:rPr lang="en-US" dirty="0" smtClean="0"/>
-              <a:t>location   </a:t>
-            </a:r>
-            <a:r>
-              <a:rPr lang="en-US" dirty="0" smtClean="0"/>
-              <a:t>: 3-2-recommendations</a:t>
-            </a:r>
-          </a:p>
-          <a:p>
-            <a:r>
-              <a:rPr lang="en-US" dirty="0" smtClean="0"/>
-              <a:t>Try out the solution </a:t>
-            </a:r>
-            <a:r>
-              <a:rPr lang="en-US" dirty="0" smtClean="0"/>
-              <a:t>line-by-line</a:t>
-            </a:r>
-            <a:endParaRPr lang="en-US" dirty="0" smtClean="0"/>
-          </a:p>
-        </p:txBody>
-      </p:sp>
-      <p:sp>
-        <p:nvSpPr>
-          <p:cNvPr id="4" name="Footer Placeholder 3"/>
+        </p:nvPicPr>
+        <p:blipFill>
+          <a:blip r:embed="rId2">
+            <a:extLst>
+              <a:ext uri="{28A0092B-C50C-407E-A947-70E740481C1C}">
+                <a14:useLocalDpi xmlns:a14="http://schemas.microsoft.com/office/drawing/2010/main" xmlns="" val="0"/>
+              </a:ext>
+            </a:extLst>
+          </a:blip>
+          <a:srcRect t="-13879" b="-13879"/>
+          <a:stretch>
+            <a:fillRect/>
+          </a:stretch>
+        </p:blipFill>
+        <p:spPr/>
+      </p:pic>
+      <p:sp>
+        <p:nvSpPr>
+          <p:cNvPr id="3" name="Footer Placeholder 2"/>
           <p:cNvSpPr>
             <a:spLocks noGrp="1"/>
           </p:cNvSpPr>
@@ -13238,7 +13050,7 @@
     </p:spTree>
     <p:extLst>
       <p:ext uri="{BB962C8B-B14F-4D97-AF65-F5344CB8AC3E}">
-        <p14:creationId xmlns:p14="http://schemas.microsoft.com/office/powerpoint/2010/main" xmlns="" val="3599210062"/>
+        <p14:creationId xmlns:p14="http://schemas.microsoft.com/office/powerpoint/2010/main" xmlns="" val="3658327973"/>
       </p:ext>
     </p:extLst>
   </p:cSld>
@@ -13289,7 +13101,7 @@
           <a:p>
             <a:r>
               <a:rPr lang="en-US" dirty="0" smtClean="0"/>
-              <a:t>ROC Curve</a:t>
+              <a:t>Item Ratings Matrix</a:t>
             </a:r>
             <a:endParaRPr lang="en-US" dirty="0"/>
           </a:p>
@@ -13297,7 +13109,7 @@
       </p:sp>
       <p:pic>
         <p:nvPicPr>
-          <p:cNvPr id="6" name="Content Placeholder 5" descr="ROC_space.png"/>
+          <p:cNvPr id="4" name="Content Placeholder 3" descr="Screen Shot 2014-06-17 at 11.29.51 PM.png"/>
           <p:cNvPicPr>
             <a:picLocks noGrp="1" noChangeAspect="1"/>
           </p:cNvPicPr>
@@ -13313,7 +13125,7 @@
               </a:ext>
             </a:extLst>
           </a:blip>
-          <a:srcRect l="-43632" r="-43632"/>
+          <a:srcRect l="-14843" r="-14843"/>
           <a:stretch>
             <a:fillRect/>
           </a:stretch>
@@ -13322,7 +13134,7 @@
       </p:pic>
       <p:sp>
         <p:nvSpPr>
-          <p:cNvPr id="4" name="Footer Placeholder 3"/>
+          <p:cNvPr id="3" name="Footer Placeholder 2"/>
           <p:cNvSpPr>
             <a:spLocks noGrp="1"/>
           </p:cNvSpPr>
@@ -13336,10 +13148,10 @@
           <a:lstStyle/>
           <a:p>
             <a:r>
-              <a:rPr lang="en-US" smtClean="0"/>
+              <a:rPr lang="en-US" dirty="0" smtClean="0"/>
               <a:t>(c) ElephantScale.com 2014</a:t>
             </a:r>
-            <a:endParaRPr lang="en-US"/>
+            <a:endParaRPr lang="en-US" dirty="0"/>
           </a:p>
         </p:txBody>
       </p:sp>
@@ -13363,83 +13175,14 @@
               <a:pPr/>
               <a:t>27</a:t>
             </a:fld>
-            <a:endParaRPr lang="en-US"/>
-          </a:p>
-        </p:txBody>
-      </p:sp>
-      <p:sp>
-        <p:nvSpPr>
-          <p:cNvPr id="7" name="TextBox 6"/>
-          <p:cNvSpPr txBox="1"/>
-          <p:nvPr/>
-        </p:nvSpPr>
-        <p:spPr>
-          <a:xfrm>
-            <a:off x="2647643" y="6402948"/>
-            <a:ext cx="5658157" cy="307777"/>
-          </a:xfrm>
-          <a:prstGeom prst="rect">
-            <a:avLst/>
-          </a:prstGeom>
-          <a:noFill/>
-        </p:spPr>
-        <p:txBody>
-          <a:bodyPr wrap="none" rtlCol="0">
-            <a:spAutoFit/>
-          </a:bodyPr>
-          <a:lstStyle/>
-          <a:p>
-            <a:r>
-              <a:rPr lang="en-US" sz="1400" dirty="0">
-                <a:solidFill>
-                  <a:schemeClr val="bg1">
-                    <a:lumMod val="65000"/>
-                  </a:schemeClr>
-                </a:solidFill>
-              </a:rPr>
-              <a:t>Source : http://</a:t>
-            </a:r>
-            <a:r>
-              <a:rPr lang="en-US" sz="1400" dirty="0" err="1">
-                <a:solidFill>
-                  <a:schemeClr val="bg1">
-                    <a:lumMod val="65000"/>
-                  </a:schemeClr>
-                </a:solidFill>
-              </a:rPr>
-              <a:t>commons.wikimedia.org</a:t>
-            </a:r>
-            <a:r>
-              <a:rPr lang="en-US" sz="1400" dirty="0">
-                <a:solidFill>
-                  <a:schemeClr val="bg1">
-                    <a:lumMod val="65000"/>
-                  </a:schemeClr>
-                </a:solidFill>
-              </a:rPr>
-              <a:t>/wiki/</a:t>
-            </a:r>
-            <a:r>
-              <a:rPr lang="en-US" sz="1400" dirty="0" err="1">
-                <a:solidFill>
-                  <a:schemeClr val="bg1">
-                    <a:lumMod val="65000"/>
-                  </a:schemeClr>
-                </a:solidFill>
-              </a:rPr>
-              <a:t>File:ROC_space.png</a:t>
-            </a:r>
-            <a:r>
-              <a:rPr lang="en-US" sz="1400" dirty="0"/>
-              <a:t> </a:t>
-            </a:r>
+            <a:endParaRPr lang="en-US" dirty="0"/>
           </a:p>
         </p:txBody>
       </p:sp>
     </p:spTree>
     <p:extLst>
       <p:ext uri="{BB962C8B-B14F-4D97-AF65-F5344CB8AC3E}">
-        <p14:creationId xmlns:p14="http://schemas.microsoft.com/office/powerpoint/2010/main" xmlns="" val="2886531117"/>
+        <p14:creationId xmlns:p14="http://schemas.microsoft.com/office/powerpoint/2010/main" xmlns="" val="2784375879"/>
       </p:ext>
     </p:extLst>
   </p:cSld>
@@ -13489,32 +13232,201 @@
           <a:lstStyle/>
           <a:p>
             <a:r>
-              <a:rPr lang="en-US" dirty="0" smtClean="0"/>
-              <a:t>Evaluating Recommendations</a:t>
+              <a:rPr lang="en-US" dirty="0" err="1" smtClean="0"/>
+              <a:t>MLLib</a:t>
+            </a:r>
+            <a:r>
+              <a:rPr lang="en-US" dirty="0" smtClean="0"/>
+              <a:t> &amp; Recommendations</a:t>
             </a:r>
             <a:endParaRPr lang="en-US" dirty="0"/>
           </a:p>
         </p:txBody>
       </p:sp>
-      <p:pic>
-        <p:nvPicPr>
-          <p:cNvPr id="6" name="Content Placeholder 5"/>
-          <p:cNvPicPr>
-            <a:picLocks noGrp="1" noChangeAspect="1"/>
-          </p:cNvPicPr>
+      <p:sp>
+        <p:nvSpPr>
+          <p:cNvPr id="3" name="Content Placeholder 2"/>
+          <p:cNvSpPr>
+            <a:spLocks noGrp="1"/>
+          </p:cNvSpPr>
           <p:nvPr>
             <p:ph idx="1"/>
           </p:nvPr>
-        </p:nvPicPr>
-        <p:blipFill>
-          <a:blip r:embed="rId2"/>
-          <a:srcRect t="23" b="23"/>
-          <a:stretch>
-            <a:fillRect/>
-          </a:stretch>
-        </p:blipFill>
-        <p:spPr/>
-      </p:pic>
+        </p:nvSpPr>
+        <p:spPr/>
+        <p:txBody>
+          <a:bodyPr/>
+          <a:lstStyle/>
+          <a:p>
+            <a:r>
+              <a:rPr lang="en-US" dirty="0" smtClean="0"/>
+              <a:t>Uses the Recommendations.ALS</a:t>
+            </a:r>
+          </a:p>
+          <a:p>
+            <a:r>
+              <a:rPr lang="en-US" dirty="0" smtClean="0"/>
+              <a:t>ALS = Alternating Least Squares algorithm</a:t>
+            </a:r>
+          </a:p>
+          <a:p>
+            <a:r>
+              <a:rPr lang="en-US" dirty="0" smtClean="0"/>
+              <a:t>Train Model using number of iterations and rank.</a:t>
+            </a:r>
+          </a:p>
+          <a:p>
+            <a:r>
+              <a:rPr lang="en-US" dirty="0" smtClean="0"/>
+              <a:t>Class “Rating”, contains a </a:t>
+            </a:r>
+            <a:r>
+              <a:rPr lang="en-US" dirty="0" err="1" smtClean="0"/>
+              <a:t>UserId</a:t>
+            </a:r>
+            <a:r>
+              <a:rPr lang="en-US" dirty="0" smtClean="0"/>
+              <a:t>, </a:t>
+            </a:r>
+            <a:r>
+              <a:rPr lang="en-US" dirty="0" err="1" smtClean="0"/>
+              <a:t>ItemId</a:t>
+            </a:r>
+            <a:r>
+              <a:rPr lang="en-US" dirty="0" smtClean="0"/>
+              <a:t>, and numeric rating (i.e. 0-5).  </a:t>
+            </a:r>
+          </a:p>
+          <a:p>
+            <a:pPr lvl="1"/>
+            <a:r>
+              <a:rPr lang="en-US" b="1" dirty="0" err="1" smtClean="0"/>
+              <a:t>val</a:t>
+            </a:r>
+            <a:r>
+              <a:rPr lang="en-US" dirty="0" smtClean="0"/>
+              <a:t> ratings </a:t>
+            </a:r>
+            <a:r>
+              <a:rPr lang="en-US" b="1" dirty="0" smtClean="0"/>
+              <a:t>=</a:t>
+            </a:r>
+            <a:r>
+              <a:rPr lang="en-US" dirty="0" smtClean="0"/>
+              <a:t> data.map(</a:t>
+            </a:r>
+            <a:r>
+              <a:rPr lang="en-US" b="1" dirty="0" smtClean="0"/>
+              <a:t>_</a:t>
+            </a:r>
+            <a:r>
+              <a:rPr lang="en-US" dirty="0" smtClean="0"/>
+              <a:t>.split(',') </a:t>
+            </a:r>
+            <a:r>
+              <a:rPr lang="en-US" b="1" dirty="0" smtClean="0"/>
+              <a:t>match</a:t>
+            </a:r>
+            <a:r>
+              <a:rPr lang="en-US" dirty="0" smtClean="0"/>
+              <a:t> { </a:t>
+            </a:r>
+            <a:r>
+              <a:rPr lang="en-US" b="1" dirty="0" smtClean="0"/>
+              <a:t>case</a:t>
+            </a:r>
+            <a:r>
+              <a:rPr lang="en-US" dirty="0" smtClean="0"/>
+              <a:t> </a:t>
+            </a:r>
+            <a:r>
+              <a:rPr lang="en-US" b="1" dirty="0" smtClean="0"/>
+              <a:t>Array</a:t>
+            </a:r>
+            <a:r>
+              <a:rPr lang="en-US" dirty="0" smtClean="0"/>
+              <a:t>(user, item, rate) </a:t>
+            </a:r>
+            <a:r>
+              <a:rPr lang="en-US" b="1" dirty="0" smtClean="0"/>
+              <a:t>=&gt;</a:t>
+            </a:r>
+            <a:r>
+              <a:rPr lang="en-US" dirty="0" smtClean="0"/>
+              <a:t> </a:t>
+            </a:r>
+            <a:r>
+              <a:rPr lang="en-US" b="1" dirty="0" smtClean="0"/>
+              <a:t>Rating</a:t>
+            </a:r>
+            <a:r>
+              <a:rPr lang="en-US" dirty="0" smtClean="0"/>
+              <a:t>(</a:t>
+            </a:r>
+            <a:r>
+              <a:rPr lang="en-US" dirty="0" err="1" smtClean="0"/>
+              <a:t>user.toInt</a:t>
+            </a:r>
+            <a:r>
+              <a:rPr lang="en-US" dirty="0" smtClean="0"/>
+              <a:t>, </a:t>
+            </a:r>
+            <a:r>
+              <a:rPr lang="en-US" dirty="0" err="1" smtClean="0"/>
+              <a:t>item.toInt</a:t>
+            </a:r>
+            <a:r>
+              <a:rPr lang="en-US" dirty="0" smtClean="0"/>
+              <a:t>, </a:t>
+            </a:r>
+            <a:r>
+              <a:rPr lang="en-US" dirty="0" err="1" smtClean="0"/>
+              <a:t>rate.toDouble</a:t>
+            </a:r>
+            <a:r>
+              <a:rPr lang="en-US" dirty="0" smtClean="0"/>
+              <a:t>) })</a:t>
+            </a:r>
+          </a:p>
+          <a:p>
+            <a:r>
+              <a:rPr lang="en-US" dirty="0" smtClean="0"/>
+              <a:t>Train model using training data:</a:t>
+            </a:r>
+          </a:p>
+          <a:p>
+            <a:pPr lvl="1"/>
+            <a:r>
+              <a:rPr lang="sv-SE" b="1" dirty="0" smtClean="0"/>
+              <a:t>val</a:t>
+            </a:r>
+            <a:r>
+              <a:rPr lang="sv-SE" dirty="0" smtClean="0"/>
+              <a:t> model </a:t>
+            </a:r>
+            <a:r>
+              <a:rPr lang="sv-SE" b="1" dirty="0" smtClean="0"/>
+              <a:t>=</a:t>
+            </a:r>
+            <a:r>
+              <a:rPr lang="sv-SE" dirty="0" smtClean="0"/>
+              <a:t> </a:t>
+            </a:r>
+            <a:r>
+              <a:rPr lang="sv-SE" b="1" dirty="0" smtClean="0"/>
+              <a:t>ALS</a:t>
+            </a:r>
+            <a:r>
+              <a:rPr lang="sv-SE" dirty="0" smtClean="0"/>
+              <a:t>.train(ratings, rank, numIterations, 0.01)</a:t>
+            </a:r>
+          </a:p>
+          <a:p>
+            <a:pPr lvl="1"/>
+            <a:endParaRPr lang="en-US" dirty="0"/>
+          </a:p>
+        </p:txBody>
+      </p:sp>
       <p:sp>
         <p:nvSpPr>
           <p:cNvPr id="4" name="Footer Placeholder 3"/>
@@ -13565,13 +13477,20 @@
     </p:spTree>
     <p:extLst>
       <p:ext uri="{BB962C8B-B14F-4D97-AF65-F5344CB8AC3E}">
-        <p14:creationId xmlns:p14="http://schemas.microsoft.com/office/powerpoint/2010/main" xmlns="" val="116143660"/>
+        <p14:creationId xmlns:p14="http://schemas.microsoft.com/office/powerpoint/2010/main" xmlns="" val="1251454248"/>
       </p:ext>
     </p:extLst>
   </p:cSld>
   <p:clrMapOvr>
     <a:masterClrMapping/>
   </p:clrMapOvr>
+  <p:timing>
+    <p:tnLst>
+      <p:par>
+        <p:cTn id="1" dur="indefinite" restart="never" nodeType="tmRoot"/>
+      </p:par>
+    </p:tnLst>
+  </p:timing>
 </p:sld>
 </file>
 
@@ -13609,31 +13528,37 @@
           <a:p>
             <a:r>
               <a:rPr lang="en-US" dirty="0" smtClean="0"/>
-              <a:t>Next : Classifications</a:t>
+              <a:t>ROC Curve</a:t>
             </a:r>
             <a:endParaRPr lang="en-US" dirty="0"/>
           </a:p>
         </p:txBody>
       </p:sp>
-      <p:sp>
-        <p:nvSpPr>
-          <p:cNvPr id="3" name="Content Placeholder 2"/>
-          <p:cNvSpPr>
-            <a:spLocks noGrp="1"/>
-          </p:cNvSpPr>
+      <p:pic>
+        <p:nvPicPr>
+          <p:cNvPr id="6" name="Content Placeholder 5" descr="ROC_space.png"/>
+          <p:cNvPicPr>
+            <a:picLocks noGrp="1" noChangeAspect="1"/>
+          </p:cNvPicPr>
           <p:nvPr>
             <p:ph idx="1"/>
           </p:nvPr>
-        </p:nvSpPr>
-        <p:spPr/>
-        <p:txBody>
-          <a:bodyPr/>
-          <a:lstStyle/>
-          <a:p>
-            <a:endParaRPr lang="en-US"/>
-          </a:p>
-        </p:txBody>
-      </p:sp>
+        </p:nvPicPr>
+        <p:blipFill>
+          <a:blip r:embed="rId2">
+            <a:extLst>
+              <a:ext uri="{28A0092B-C50C-407E-A947-70E740481C1C}">
+                <a14:useLocalDpi xmlns:a14="http://schemas.microsoft.com/office/drawing/2010/main" xmlns="" val="0"/>
+              </a:ext>
+            </a:extLst>
+          </a:blip>
+          <a:srcRect l="-43632" r="-43632"/>
+          <a:stretch>
+            <a:fillRect/>
+          </a:stretch>
+        </p:blipFill>
+        <p:spPr/>
+      </p:pic>
       <p:sp>
         <p:nvSpPr>
           <p:cNvPr id="4" name="Footer Placeholder 3"/>
@@ -13681,10 +13606,79 @@
           </a:p>
         </p:txBody>
       </p:sp>
+      <p:sp>
+        <p:nvSpPr>
+          <p:cNvPr id="7" name="TextBox 6"/>
+          <p:cNvSpPr txBox="1"/>
+          <p:nvPr/>
+        </p:nvSpPr>
+        <p:spPr>
+          <a:xfrm>
+            <a:off x="2647643" y="6402948"/>
+            <a:ext cx="5658157" cy="307777"/>
+          </a:xfrm>
+          <a:prstGeom prst="rect">
+            <a:avLst/>
+          </a:prstGeom>
+          <a:noFill/>
+        </p:spPr>
+        <p:txBody>
+          <a:bodyPr wrap="none" rtlCol="0">
+            <a:spAutoFit/>
+          </a:bodyPr>
+          <a:lstStyle/>
+          <a:p>
+            <a:r>
+              <a:rPr lang="en-US" sz="1400" dirty="0">
+                <a:solidFill>
+                  <a:schemeClr val="bg1">
+                    <a:lumMod val="65000"/>
+                  </a:schemeClr>
+                </a:solidFill>
+              </a:rPr>
+              <a:t>Source : http://</a:t>
+            </a:r>
+            <a:r>
+              <a:rPr lang="en-US" sz="1400" dirty="0" err="1">
+                <a:solidFill>
+                  <a:schemeClr val="bg1">
+                    <a:lumMod val="65000"/>
+                  </a:schemeClr>
+                </a:solidFill>
+              </a:rPr>
+              <a:t>commons.wikimedia.org</a:t>
+            </a:r>
+            <a:r>
+              <a:rPr lang="en-US" sz="1400" dirty="0">
+                <a:solidFill>
+                  <a:schemeClr val="bg1">
+                    <a:lumMod val="65000"/>
+                  </a:schemeClr>
+                </a:solidFill>
+              </a:rPr>
+              <a:t>/wiki/</a:t>
+            </a:r>
+            <a:r>
+              <a:rPr lang="en-US" sz="1400" dirty="0" err="1">
+                <a:solidFill>
+                  <a:schemeClr val="bg1">
+                    <a:lumMod val="65000"/>
+                  </a:schemeClr>
+                </a:solidFill>
+              </a:rPr>
+              <a:t>File:ROC_space.png</a:t>
+            </a:r>
+            <a:r>
+              <a:rPr lang="en-US" sz="1400" dirty="0"/>
+              <a:t> </a:t>
+            </a:r>
+          </a:p>
+        </p:txBody>
+      </p:sp>
     </p:spTree>
     <p:extLst>
       <p:ext uri="{BB962C8B-B14F-4D97-AF65-F5344CB8AC3E}">
-        <p14:creationId xmlns:p14="http://schemas.microsoft.com/office/powerpoint/2010/main" xmlns="" val="3435585138"/>
+        <p14:creationId xmlns:p14="http://schemas.microsoft.com/office/powerpoint/2010/main" xmlns="" val="2886531117"/>
       </p:ext>
     </p:extLst>
   </p:cSld>
@@ -13964,7 +13958,7 @@
           <a:p>
             <a:r>
               <a:rPr lang="en-US" dirty="0" smtClean="0"/>
-              <a:t>Classification Applications</a:t>
+              <a:t>Recommendations Lab</a:t>
             </a:r>
             <a:endParaRPr lang="en-US" dirty="0"/>
           </a:p>
@@ -13987,21 +13981,37 @@
           <a:p>
             <a:r>
               <a:rPr lang="en-US" dirty="0" smtClean="0"/>
-              <a:t>Email spam or not</a:t>
-            </a:r>
-          </a:p>
-          <a:p>
-            <a:r>
-              <a:rPr lang="en-US" dirty="0" smtClean="0"/>
-              <a:t>Is </a:t>
-            </a:r>
-            <a:r>
-              <a:rPr lang="en-US" dirty="0" smtClean="0"/>
-              <a:t>a cell a cancer cell or </a:t>
-            </a:r>
-            <a:r>
-              <a:rPr lang="en-US" dirty="0" smtClean="0"/>
-              <a:t>not</a:t>
+              <a:t>We will use data from a Czech dating website: </a:t>
+            </a:r>
+            <a:r>
+              <a:rPr lang="en-US" dirty="0" err="1" smtClean="0"/>
+              <a:t>libimseti</a:t>
+            </a:r>
+            <a:endParaRPr lang="en-US" dirty="0" smtClean="0"/>
+          </a:p>
+          <a:p>
+            <a:r>
+              <a:rPr lang="en-US" dirty="0" smtClean="0"/>
+              <a:t>location   : </a:t>
+            </a:r>
+            <a:r>
+              <a:rPr lang="en-US" dirty="0" err="1" smtClean="0"/>
+              <a:t>mllib</a:t>
+            </a:r>
+            <a:r>
+              <a:rPr lang="en-US" dirty="0" smtClean="0"/>
+              <a:t>/</a:t>
+            </a:r>
+            <a:r>
+              <a:rPr lang="en-US" dirty="0" err="1" smtClean="0"/>
+              <a:t>recs</a:t>
+            </a:r>
+            <a:endParaRPr lang="en-US" dirty="0" smtClean="0"/>
+          </a:p>
+          <a:p>
+            <a:r>
+              <a:rPr lang="en-US" dirty="0" smtClean="0"/>
+              <a:t>Try out the solution line-by-line</a:t>
             </a:r>
           </a:p>
         </p:txBody>
@@ -14048,6 +14058,267 @@
               <a:rPr lang="en-US" smtClean="0"/>
               <a:pPr/>
               <a:t>30</a:t>
+            </a:fld>
+            <a:endParaRPr lang="en-US"/>
+          </a:p>
+        </p:txBody>
+      </p:sp>
+    </p:spTree>
+    <p:extLst>
+      <p:ext uri="{BB962C8B-B14F-4D97-AF65-F5344CB8AC3E}">
+        <p14:creationId xmlns:p14="http://schemas.microsoft.com/office/powerpoint/2010/main" xmlns="" val="3599210062"/>
+      </p:ext>
+    </p:extLst>
+  </p:cSld>
+  <p:clrMapOvr>
+    <a:masterClrMapping/>
+  </p:clrMapOvr>
+  <p:timing>
+    <p:tnLst>
+      <p:par>
+        <p:cTn id="1" dur="indefinite" restart="never" nodeType="tmRoot"/>
+      </p:par>
+    </p:tnLst>
+  </p:timing>
+</p:sld>
+</file>
+
+<file path=ppt/slides/slide31.xml><?xml version="1.0" encoding="utf-8"?>
+<p:sld xmlns:a="http://schemas.openxmlformats.org/drawingml/2006/main" xmlns:r="http://schemas.openxmlformats.org/officeDocument/2006/relationships" xmlns:p="http://schemas.openxmlformats.org/presentationml/2006/main">
+  <p:cSld>
+    <p:spTree>
+      <p:nvGrpSpPr>
+        <p:cNvPr id="1" name=""/>
+        <p:cNvGrpSpPr/>
+        <p:nvPr/>
+      </p:nvGrpSpPr>
+      <p:grpSpPr>
+        <a:xfrm>
+          <a:off x="0" y="0"/>
+          <a:ext cx="0" cy="0"/>
+          <a:chOff x="0" y="0"/>
+          <a:chExt cx="0" cy="0"/>
+        </a:xfrm>
+      </p:grpSpPr>
+      <p:sp>
+        <p:nvSpPr>
+          <p:cNvPr id="2" name="Title 1"/>
+          <p:cNvSpPr>
+            <a:spLocks noGrp="1"/>
+          </p:cNvSpPr>
+          <p:nvPr>
+            <p:ph type="title"/>
+          </p:nvPr>
+        </p:nvSpPr>
+        <p:spPr/>
+        <p:txBody>
+          <a:bodyPr/>
+          <a:lstStyle/>
+          <a:p>
+            <a:r>
+              <a:rPr lang="en-US" dirty="0" smtClean="0"/>
+              <a:t>Next : Classifications</a:t>
+            </a:r>
+            <a:endParaRPr lang="en-US" dirty="0"/>
+          </a:p>
+        </p:txBody>
+      </p:sp>
+      <p:sp>
+        <p:nvSpPr>
+          <p:cNvPr id="3" name="Content Placeholder 2"/>
+          <p:cNvSpPr>
+            <a:spLocks noGrp="1"/>
+          </p:cNvSpPr>
+          <p:nvPr>
+            <p:ph idx="1"/>
+          </p:nvPr>
+        </p:nvSpPr>
+        <p:spPr/>
+        <p:txBody>
+          <a:bodyPr/>
+          <a:lstStyle/>
+          <a:p>
+            <a:endParaRPr lang="en-US"/>
+          </a:p>
+        </p:txBody>
+      </p:sp>
+      <p:sp>
+        <p:nvSpPr>
+          <p:cNvPr id="4" name="Footer Placeholder 3"/>
+          <p:cNvSpPr>
+            <a:spLocks noGrp="1"/>
+          </p:cNvSpPr>
+          <p:nvPr>
+            <p:ph type="ftr" sz="quarter" idx="11"/>
+          </p:nvPr>
+        </p:nvSpPr>
+        <p:spPr/>
+        <p:txBody>
+          <a:bodyPr/>
+          <a:lstStyle/>
+          <a:p>
+            <a:r>
+              <a:rPr lang="en-US" smtClean="0"/>
+              <a:t>(c) ElephantScale.com 2014</a:t>
+            </a:r>
+            <a:endParaRPr lang="en-US"/>
+          </a:p>
+        </p:txBody>
+      </p:sp>
+      <p:sp>
+        <p:nvSpPr>
+          <p:cNvPr id="5" name="Slide Number Placeholder 4"/>
+          <p:cNvSpPr>
+            <a:spLocks noGrp="1"/>
+          </p:cNvSpPr>
+          <p:nvPr>
+            <p:ph type="sldNum" sz="quarter" idx="12"/>
+          </p:nvPr>
+        </p:nvSpPr>
+        <p:spPr/>
+        <p:txBody>
+          <a:bodyPr/>
+          <a:lstStyle/>
+          <a:p>
+            <a:fld id="{4AD8DDEF-9CD1-B641-ADE5-2BEE59567BE6}" type="slidenum">
+              <a:rPr lang="en-US" smtClean="0"/>
+              <a:pPr/>
+              <a:t>31</a:t>
+            </a:fld>
+            <a:endParaRPr lang="en-US"/>
+          </a:p>
+        </p:txBody>
+      </p:sp>
+    </p:spTree>
+    <p:extLst>
+      <p:ext uri="{BB962C8B-B14F-4D97-AF65-F5344CB8AC3E}">
+        <p14:creationId xmlns:p14="http://schemas.microsoft.com/office/powerpoint/2010/main" xmlns="" val="3435585138"/>
+      </p:ext>
+    </p:extLst>
+  </p:cSld>
+  <p:clrMapOvr>
+    <a:masterClrMapping/>
+  </p:clrMapOvr>
+  <p:timing>
+    <p:tnLst>
+      <p:par>
+        <p:cTn id="1" dur="indefinite" restart="never" nodeType="tmRoot"/>
+      </p:par>
+    </p:tnLst>
+  </p:timing>
+</p:sld>
+</file>
+
+<file path=ppt/slides/slide32.xml><?xml version="1.0" encoding="utf-8"?>
+<p:sld xmlns:a="http://schemas.openxmlformats.org/drawingml/2006/main" xmlns:r="http://schemas.openxmlformats.org/officeDocument/2006/relationships" xmlns:p="http://schemas.openxmlformats.org/presentationml/2006/main">
+  <p:cSld>
+    <p:spTree>
+      <p:nvGrpSpPr>
+        <p:cNvPr id="1" name=""/>
+        <p:cNvGrpSpPr/>
+        <p:nvPr/>
+      </p:nvGrpSpPr>
+      <p:grpSpPr>
+        <a:xfrm>
+          <a:off x="0" y="0"/>
+          <a:ext cx="0" cy="0"/>
+          <a:chOff x="0" y="0"/>
+          <a:chExt cx="0" cy="0"/>
+        </a:xfrm>
+      </p:grpSpPr>
+      <p:sp>
+        <p:nvSpPr>
+          <p:cNvPr id="2" name="Title 1"/>
+          <p:cNvSpPr>
+            <a:spLocks noGrp="1"/>
+          </p:cNvSpPr>
+          <p:nvPr>
+            <p:ph type="title"/>
+          </p:nvPr>
+        </p:nvSpPr>
+        <p:spPr/>
+        <p:txBody>
+          <a:bodyPr/>
+          <a:lstStyle/>
+          <a:p>
+            <a:r>
+              <a:rPr lang="en-US" dirty="0" smtClean="0"/>
+              <a:t>Classification Applications</a:t>
+            </a:r>
+            <a:endParaRPr lang="en-US" dirty="0"/>
+          </a:p>
+        </p:txBody>
+      </p:sp>
+      <p:sp>
+        <p:nvSpPr>
+          <p:cNvPr id="3" name="Content Placeholder 2"/>
+          <p:cNvSpPr>
+            <a:spLocks noGrp="1"/>
+          </p:cNvSpPr>
+          <p:nvPr>
+            <p:ph idx="1"/>
+          </p:nvPr>
+        </p:nvSpPr>
+        <p:spPr/>
+        <p:txBody>
+          <a:bodyPr/>
+          <a:lstStyle/>
+          <a:p>
+            <a:r>
+              <a:rPr lang="en-US" dirty="0" smtClean="0"/>
+              <a:t>Email spam or not</a:t>
+            </a:r>
+          </a:p>
+          <a:p>
+            <a:r>
+              <a:rPr lang="en-US" dirty="0" smtClean="0"/>
+              <a:t>Is a cell a cancer cell or not</a:t>
+            </a:r>
+          </a:p>
+        </p:txBody>
+      </p:sp>
+      <p:sp>
+        <p:nvSpPr>
+          <p:cNvPr id="4" name="Footer Placeholder 3"/>
+          <p:cNvSpPr>
+            <a:spLocks noGrp="1"/>
+          </p:cNvSpPr>
+          <p:nvPr>
+            <p:ph type="ftr" sz="quarter" idx="11"/>
+          </p:nvPr>
+        </p:nvSpPr>
+        <p:spPr/>
+        <p:txBody>
+          <a:bodyPr/>
+          <a:lstStyle/>
+          <a:p>
+            <a:r>
+              <a:rPr lang="en-US" smtClean="0"/>
+              <a:t>(c) ElephantScale.com 2014</a:t>
+            </a:r>
+            <a:endParaRPr lang="en-US"/>
+          </a:p>
+        </p:txBody>
+      </p:sp>
+      <p:sp>
+        <p:nvSpPr>
+          <p:cNvPr id="5" name="Slide Number Placeholder 4"/>
+          <p:cNvSpPr>
+            <a:spLocks noGrp="1"/>
+          </p:cNvSpPr>
+          <p:nvPr>
+            <p:ph type="sldNum" sz="quarter" idx="12"/>
+          </p:nvPr>
+        </p:nvSpPr>
+        <p:spPr/>
+        <p:txBody>
+          <a:bodyPr/>
+          <a:lstStyle/>
+          <a:p>
+            <a:fld id="{4AD8DDEF-9CD1-B641-ADE5-2BEE59567BE6}" type="slidenum">
+              <a:rPr lang="en-US" smtClean="0"/>
+              <a:pPr/>
+              <a:t>32</a:t>
             </a:fld>
             <a:endParaRPr lang="en-US"/>
           </a:p>
@@ -14130,7 +14401,7 @@
 </p:sld>
 </file>
 
-<file path=ppt/slides/slide31.xml><?xml version="1.0" encoding="utf-8"?>
+<file path=ppt/slides/slide33.xml><?xml version="1.0" encoding="utf-8"?>
 <p:sld xmlns:a="http://schemas.openxmlformats.org/drawingml/2006/main" xmlns:r="http://schemas.openxmlformats.org/officeDocument/2006/relationships" xmlns:p="http://schemas.openxmlformats.org/presentationml/2006/main">
   <p:cSld>
     <p:spTree>
@@ -14195,7 +14466,6 @@
               <a:rPr lang="en-US" dirty="0" smtClean="0"/>
               <a:t>Same as regression – except categorical rather than numeric</a:t>
             </a:r>
-            <a:endParaRPr lang="en-US" dirty="0" smtClean="0"/>
           </a:p>
           <a:p>
             <a:r>
@@ -14252,7 +14522,7 @@
             <a:fld id="{4AD8DDEF-9CD1-B641-ADE5-2BEE59567BE6}" type="slidenum">
               <a:rPr lang="en-US" smtClean="0"/>
               <a:pPr/>
-              <a:t>31</a:t>
+              <a:t>33</a:t>
             </a:fld>
             <a:endParaRPr lang="en-US"/>
           </a:p>
@@ -14278,307 +14548,6 @@
 </p:sld>
 </file>
 
-<file path=ppt/slides/slide32.xml><?xml version="1.0" encoding="utf-8"?>
-<p:sld xmlns:a="http://schemas.openxmlformats.org/drawingml/2006/main" xmlns:r="http://schemas.openxmlformats.org/officeDocument/2006/relationships" xmlns:p="http://schemas.openxmlformats.org/presentationml/2006/main">
-  <p:cSld>
-    <p:spTree>
-      <p:nvGrpSpPr>
-        <p:cNvPr id="1" name=""/>
-        <p:cNvGrpSpPr/>
-        <p:nvPr/>
-      </p:nvGrpSpPr>
-      <p:grpSpPr>
-        <a:xfrm>
-          <a:off x="0" y="0"/>
-          <a:ext cx="0" cy="0"/>
-          <a:chOff x="0" y="0"/>
-          <a:chExt cx="0" cy="0"/>
-        </a:xfrm>
-      </p:grpSpPr>
-      <p:sp>
-        <p:nvSpPr>
-          <p:cNvPr id="2" name="Title 1"/>
-          <p:cNvSpPr>
-            <a:spLocks noGrp="1"/>
-          </p:cNvSpPr>
-          <p:nvPr>
-            <p:ph type="title"/>
-          </p:nvPr>
-        </p:nvSpPr>
-        <p:spPr/>
-        <p:txBody>
-          <a:bodyPr/>
-          <a:lstStyle/>
-          <a:p>
-            <a:r>
-              <a:rPr lang="en-US" dirty="0" smtClean="0"/>
-              <a:t>Review of Classification Algorithms</a:t>
-            </a:r>
-            <a:endParaRPr lang="en-US" dirty="0"/>
-          </a:p>
-        </p:txBody>
-      </p:sp>
-      <p:sp>
-        <p:nvSpPr>
-          <p:cNvPr id="3" name="Content Placeholder 2"/>
-          <p:cNvSpPr>
-            <a:spLocks noGrp="1"/>
-          </p:cNvSpPr>
-          <p:nvPr>
-            <p:ph idx="1"/>
-          </p:nvPr>
-        </p:nvSpPr>
-        <p:spPr/>
-        <p:txBody>
-          <a:bodyPr/>
-          <a:lstStyle/>
-          <a:p>
-            <a:pPr lvl="1"/>
-            <a:r>
-              <a:rPr lang="en-US" dirty="0" smtClean="0"/>
-              <a:t>Naïve </a:t>
-            </a:r>
-            <a:r>
-              <a:rPr lang="en-US" dirty="0" err="1" smtClean="0"/>
-              <a:t>Bayes</a:t>
-            </a:r>
-            <a:endParaRPr lang="en-US" dirty="0" smtClean="0"/>
-          </a:p>
-          <a:p>
-            <a:pPr lvl="1"/>
-            <a:r>
-              <a:rPr lang="en-US" dirty="0" smtClean="0"/>
-              <a:t>Support Vector Machines</a:t>
-            </a:r>
-          </a:p>
-          <a:p>
-            <a:pPr lvl="1"/>
-            <a:r>
-              <a:rPr lang="en-US" dirty="0" smtClean="0"/>
-              <a:t>Logistic Regression / </a:t>
-            </a:r>
-            <a:r>
-              <a:rPr lang="en-US" dirty="0" err="1" smtClean="0"/>
-              <a:t>MaxEntropy</a:t>
-            </a:r>
-            <a:endParaRPr lang="en-US" dirty="0" smtClean="0"/>
-          </a:p>
-          <a:p>
-            <a:pPr lvl="1"/>
-            <a:r>
-              <a:rPr lang="en-US" dirty="0" smtClean="0"/>
-              <a:t>Decision Trees</a:t>
-            </a:r>
-          </a:p>
-          <a:p>
-            <a:pPr lvl="2"/>
-            <a:r>
-              <a:rPr lang="en-US" dirty="0" smtClean="0"/>
-              <a:t>A basic decision tree is pretty simple. </a:t>
-            </a:r>
-          </a:p>
-          <a:p>
-            <a:pPr lvl="2"/>
-            <a:r>
-              <a:rPr lang="en-US" dirty="0" smtClean="0"/>
-              <a:t>It is a set of rules collect the rule</a:t>
-            </a:r>
-          </a:p>
-          <a:p>
-            <a:pPr lvl="2"/>
-            <a:r>
-              <a:rPr lang="en-US" dirty="0" smtClean="0"/>
-              <a:t>Decision tree learning is a means of inferring an appropriate decision tree from the data.</a:t>
-            </a:r>
-          </a:p>
-        </p:txBody>
-      </p:sp>
-      <p:sp>
-        <p:nvSpPr>
-          <p:cNvPr id="4" name="Footer Placeholder 3"/>
-          <p:cNvSpPr>
-            <a:spLocks noGrp="1"/>
-          </p:cNvSpPr>
-          <p:nvPr>
-            <p:ph type="ftr" sz="quarter" idx="11"/>
-          </p:nvPr>
-        </p:nvSpPr>
-        <p:spPr/>
-        <p:txBody>
-          <a:bodyPr/>
-          <a:lstStyle/>
-          <a:p>
-            <a:r>
-              <a:rPr lang="en-US" smtClean="0"/>
-              <a:t>(c) ElephantScale.com 2014</a:t>
-            </a:r>
-            <a:endParaRPr lang="en-US"/>
-          </a:p>
-        </p:txBody>
-      </p:sp>
-      <p:sp>
-        <p:nvSpPr>
-          <p:cNvPr id="5" name="Slide Number Placeholder 4"/>
-          <p:cNvSpPr>
-            <a:spLocks noGrp="1"/>
-          </p:cNvSpPr>
-          <p:nvPr>
-            <p:ph type="sldNum" sz="quarter" idx="12"/>
-          </p:nvPr>
-        </p:nvSpPr>
-        <p:spPr/>
-        <p:txBody>
-          <a:bodyPr/>
-          <a:lstStyle/>
-          <a:p>
-            <a:fld id="{4AD8DDEF-9CD1-B641-ADE5-2BEE59567BE6}" type="slidenum">
-              <a:rPr lang="en-US" smtClean="0"/>
-              <a:pPr/>
-              <a:t>32</a:t>
-            </a:fld>
-            <a:endParaRPr lang="en-US"/>
-          </a:p>
-        </p:txBody>
-      </p:sp>
-    </p:spTree>
-    <p:extLst>
-      <p:ext uri="{BB962C8B-B14F-4D97-AF65-F5344CB8AC3E}">
-        <p14:creationId xmlns:p14="http://schemas.microsoft.com/office/powerpoint/2010/main" xmlns="" val="1098878060"/>
-      </p:ext>
-    </p:extLst>
-  </p:cSld>
-  <p:clrMapOvr>
-    <a:masterClrMapping/>
-  </p:clrMapOvr>
-  <p:timing>
-    <p:tnLst>
-      <p:par>
-        <p:cTn id="1" dur="indefinite" restart="never" nodeType="tmRoot"/>
-      </p:par>
-    </p:tnLst>
-  </p:timing>
-</p:sld>
-</file>
-
-<file path=ppt/slides/slide33.xml><?xml version="1.0" encoding="utf-8"?>
-<p:sld xmlns:a="http://schemas.openxmlformats.org/drawingml/2006/main" xmlns:r="http://schemas.openxmlformats.org/officeDocument/2006/relationships" xmlns:p="http://schemas.openxmlformats.org/presentationml/2006/main">
-  <p:cSld>
-    <p:spTree>
-      <p:nvGrpSpPr>
-        <p:cNvPr id="1" name=""/>
-        <p:cNvGrpSpPr/>
-        <p:nvPr/>
-      </p:nvGrpSpPr>
-      <p:grpSpPr>
-        <a:xfrm>
-          <a:off x="0" y="0"/>
-          <a:ext cx="0" cy="0"/>
-          <a:chOff x="0" y="0"/>
-          <a:chExt cx="0" cy="0"/>
-        </a:xfrm>
-      </p:grpSpPr>
-      <p:sp>
-        <p:nvSpPr>
-          <p:cNvPr id="2" name="Title 1"/>
-          <p:cNvSpPr>
-            <a:spLocks noGrp="1"/>
-          </p:cNvSpPr>
-          <p:nvPr>
-            <p:ph type="title"/>
-          </p:nvPr>
-        </p:nvSpPr>
-        <p:spPr/>
-        <p:txBody>
-          <a:bodyPr/>
-          <a:lstStyle/>
-          <a:p>
-            <a:r>
-              <a:rPr lang="en-US" dirty="0" smtClean="0"/>
-              <a:t>Decision Tree</a:t>
-            </a:r>
-            <a:endParaRPr lang="en-US" dirty="0"/>
-          </a:p>
-        </p:txBody>
-      </p:sp>
-      <p:pic>
-        <p:nvPicPr>
-          <p:cNvPr id="6" name="Content Placeholder 5"/>
-          <p:cNvPicPr>
-            <a:picLocks noGrp="1" noChangeAspect="1"/>
-          </p:cNvPicPr>
-          <p:nvPr>
-            <p:ph idx="1"/>
-          </p:nvPr>
-        </p:nvPicPr>
-        <p:blipFill>
-          <a:blip r:embed="rId2"/>
-          <a:srcRect l="-46386" r="-46386"/>
-          <a:stretch>
-            <a:fillRect/>
-          </a:stretch>
-        </p:blipFill>
-        <p:spPr/>
-      </p:pic>
-      <p:sp>
-        <p:nvSpPr>
-          <p:cNvPr id="4" name="Footer Placeholder 3"/>
-          <p:cNvSpPr>
-            <a:spLocks noGrp="1"/>
-          </p:cNvSpPr>
-          <p:nvPr>
-            <p:ph type="ftr" sz="quarter" idx="11"/>
-          </p:nvPr>
-        </p:nvSpPr>
-        <p:spPr/>
-        <p:txBody>
-          <a:bodyPr/>
-          <a:lstStyle/>
-          <a:p>
-            <a:r>
-              <a:rPr lang="en-US" smtClean="0"/>
-              <a:t>(c) ElephantScale.com 2014</a:t>
-            </a:r>
-            <a:endParaRPr lang="en-US"/>
-          </a:p>
-        </p:txBody>
-      </p:sp>
-      <p:sp>
-        <p:nvSpPr>
-          <p:cNvPr id="5" name="Slide Number Placeholder 4"/>
-          <p:cNvSpPr>
-            <a:spLocks noGrp="1"/>
-          </p:cNvSpPr>
-          <p:nvPr>
-            <p:ph type="sldNum" sz="quarter" idx="12"/>
-          </p:nvPr>
-        </p:nvSpPr>
-        <p:spPr/>
-        <p:txBody>
-          <a:bodyPr/>
-          <a:lstStyle/>
-          <a:p>
-            <a:fld id="{4AD8DDEF-9CD1-B641-ADE5-2BEE59567BE6}" type="slidenum">
-              <a:rPr lang="en-US" smtClean="0"/>
-              <a:pPr/>
-              <a:t>33</a:t>
-            </a:fld>
-            <a:endParaRPr lang="en-US"/>
-          </a:p>
-        </p:txBody>
-      </p:sp>
-    </p:spTree>
-    <p:extLst>
-      <p:ext uri="{BB962C8B-B14F-4D97-AF65-F5344CB8AC3E}">
-        <p14:creationId xmlns:p14="http://schemas.microsoft.com/office/powerpoint/2010/main" xmlns="" val="2819361914"/>
-      </p:ext>
-    </p:extLst>
-  </p:cSld>
-  <p:clrMapOvr>
-    <a:masterClrMapping/>
-  </p:clrMapOvr>
-</p:sld>
-</file>
-
 <file path=ppt/slides/slide34.xml><?xml version="1.0" encoding="utf-8"?>
 <p:sld xmlns:a="http://schemas.openxmlformats.org/drawingml/2006/main" xmlns:r="http://schemas.openxmlformats.org/officeDocument/2006/relationships" xmlns:p="http://schemas.openxmlformats.org/presentationml/2006/main">
   <p:cSld>
@@ -14613,11 +14582,7 @@
           <a:p>
             <a:r>
               <a:rPr lang="en-US" dirty="0" smtClean="0"/>
-              <a:t>Classification Support in </a:t>
-            </a:r>
-            <a:r>
-              <a:rPr lang="en-US" dirty="0" err="1" smtClean="0"/>
-              <a:t>MLLib</a:t>
+              <a:t>Review of Classification Algorithms</a:t>
             </a:r>
             <a:endParaRPr lang="en-US" dirty="0"/>
           </a:p>
@@ -14639,45 +14604,6 @@
           <a:lstStyle/>
           <a:p>
             <a:pPr lvl="1"/>
-            <a:r>
-              <a:rPr lang="en-US" dirty="0" smtClean="0"/>
-              <a:t>The following algorithms are well-represented in </a:t>
-            </a:r>
-            <a:r>
-              <a:rPr lang="en-US" dirty="0" err="1" smtClean="0"/>
-              <a:t>MLLib</a:t>
-            </a:r>
-            <a:r>
-              <a:rPr lang="en-US" dirty="0" smtClean="0"/>
-              <a:t>:</a:t>
-            </a:r>
-            <a:endParaRPr lang="en-US" dirty="0" smtClean="0"/>
-          </a:p>
-          <a:p>
-            <a:pPr lvl="2"/>
-            <a:r>
-              <a:rPr lang="en-US" dirty="0" smtClean="0"/>
-              <a:t>Linear Methods: SVM, Logistic Regression</a:t>
-            </a:r>
-            <a:endParaRPr lang="en-US" dirty="0" smtClean="0"/>
-          </a:p>
-          <a:p>
-            <a:pPr lvl="2"/>
-            <a:r>
-              <a:rPr lang="en-US" dirty="0" smtClean="0"/>
-              <a:t>Decision Trees</a:t>
-            </a:r>
-            <a:endParaRPr lang="en-US" dirty="0" smtClean="0"/>
-          </a:p>
-          <a:p>
-            <a:pPr lvl="2"/>
-            <a:r>
-              <a:rPr lang="en-US" dirty="0" smtClean="0"/>
-              <a:t>Ensemble Decision Trees (Random Forests, Gradient Boosted Trees)</a:t>
-            </a:r>
-          </a:p>
-          <a:p>
-            <a:pPr lvl="2"/>
             <a:r>
               <a:rPr lang="en-US" dirty="0" smtClean="0"/>
               <a:t>Naïve </a:t>
@@ -14687,6 +14613,53 @@
               <a:t>Bayes</a:t>
             </a:r>
             <a:endParaRPr lang="en-US" dirty="0" smtClean="0"/>
+          </a:p>
+          <a:p>
+            <a:pPr lvl="1"/>
+            <a:r>
+              <a:rPr lang="en-US" dirty="0" smtClean="0"/>
+              <a:t>Support Vector Machines</a:t>
+            </a:r>
+          </a:p>
+          <a:p>
+            <a:pPr lvl="1"/>
+            <a:r>
+              <a:rPr lang="en-US" dirty="0" smtClean="0"/>
+              <a:t>Logistic Regression / </a:t>
+            </a:r>
+            <a:r>
+              <a:rPr lang="en-US" dirty="0" err="1" smtClean="0"/>
+              <a:t>MaxEntropy</a:t>
+            </a:r>
+            <a:endParaRPr lang="en-US" dirty="0" smtClean="0"/>
+          </a:p>
+          <a:p>
+            <a:pPr lvl="1"/>
+            <a:r>
+              <a:rPr lang="en-US" dirty="0" smtClean="0"/>
+              <a:t>Decision Trees</a:t>
+            </a:r>
+          </a:p>
+          <a:p>
+            <a:pPr lvl="2"/>
+            <a:r>
+              <a:rPr lang="en-US" dirty="0" smtClean="0"/>
+              <a:t>A basic decision tree is pretty simple. </a:t>
+            </a:r>
+          </a:p>
+          <a:p>
+            <a:pPr lvl="2"/>
+            <a:r>
+              <a:rPr lang="en-US" dirty="0" smtClean="0"/>
+              <a:t>It is a set of rules collect the rule</a:t>
+            </a:r>
+          </a:p>
+          <a:p>
+            <a:pPr lvl="2"/>
+            <a:r>
+              <a:rPr lang="en-US" dirty="0" smtClean="0"/>
+              <a:t>Decision tree learning is a means of inferring an appropriate decision tree from the data.</a:t>
+            </a:r>
           </a:p>
         </p:txBody>
       </p:sp>
@@ -14740,7 +14713,7 @@
     </p:spTree>
     <p:extLst>
       <p:ext uri="{BB962C8B-B14F-4D97-AF65-F5344CB8AC3E}">
-        <p14:creationId xmlns:p14="http://schemas.microsoft.com/office/powerpoint/2010/main" xmlns="" val="234258616"/>
+        <p14:creationId xmlns:p14="http://schemas.microsoft.com/office/powerpoint/2010/main" xmlns="" val="1098878060"/>
       </p:ext>
     </p:extLst>
   </p:cSld>
@@ -14791,6 +14764,454 @@
           <a:p>
             <a:r>
               <a:rPr lang="en-US" dirty="0" smtClean="0"/>
+              <a:t>Decision Tree</a:t>
+            </a:r>
+            <a:endParaRPr lang="en-US" dirty="0"/>
+          </a:p>
+        </p:txBody>
+      </p:sp>
+      <p:pic>
+        <p:nvPicPr>
+          <p:cNvPr id="6" name="Content Placeholder 5"/>
+          <p:cNvPicPr>
+            <a:picLocks noGrp="1" noChangeAspect="1"/>
+          </p:cNvPicPr>
+          <p:nvPr>
+            <p:ph idx="1"/>
+          </p:nvPr>
+        </p:nvPicPr>
+        <p:blipFill>
+          <a:blip r:embed="rId2"/>
+          <a:srcRect l="-46386" r="-46386"/>
+          <a:stretch>
+            <a:fillRect/>
+          </a:stretch>
+        </p:blipFill>
+        <p:spPr/>
+      </p:pic>
+      <p:sp>
+        <p:nvSpPr>
+          <p:cNvPr id="4" name="Footer Placeholder 3"/>
+          <p:cNvSpPr>
+            <a:spLocks noGrp="1"/>
+          </p:cNvSpPr>
+          <p:nvPr>
+            <p:ph type="ftr" sz="quarter" idx="11"/>
+          </p:nvPr>
+        </p:nvSpPr>
+        <p:spPr/>
+        <p:txBody>
+          <a:bodyPr/>
+          <a:lstStyle/>
+          <a:p>
+            <a:r>
+              <a:rPr lang="en-US" smtClean="0"/>
+              <a:t>(c) ElephantScale.com 2014</a:t>
+            </a:r>
+            <a:endParaRPr lang="en-US"/>
+          </a:p>
+        </p:txBody>
+      </p:sp>
+      <p:sp>
+        <p:nvSpPr>
+          <p:cNvPr id="5" name="Slide Number Placeholder 4"/>
+          <p:cNvSpPr>
+            <a:spLocks noGrp="1"/>
+          </p:cNvSpPr>
+          <p:nvPr>
+            <p:ph type="sldNum" sz="quarter" idx="12"/>
+          </p:nvPr>
+        </p:nvSpPr>
+        <p:spPr/>
+        <p:txBody>
+          <a:bodyPr/>
+          <a:lstStyle/>
+          <a:p>
+            <a:fld id="{4AD8DDEF-9CD1-B641-ADE5-2BEE59567BE6}" type="slidenum">
+              <a:rPr lang="en-US" smtClean="0"/>
+              <a:pPr/>
+              <a:t>35</a:t>
+            </a:fld>
+            <a:endParaRPr lang="en-US"/>
+          </a:p>
+        </p:txBody>
+      </p:sp>
+    </p:spTree>
+    <p:extLst>
+      <p:ext uri="{BB962C8B-B14F-4D97-AF65-F5344CB8AC3E}">
+        <p14:creationId xmlns:p14="http://schemas.microsoft.com/office/powerpoint/2010/main" xmlns="" val="2819361914"/>
+      </p:ext>
+    </p:extLst>
+  </p:cSld>
+  <p:clrMapOvr>
+    <a:masterClrMapping/>
+  </p:clrMapOvr>
+</p:sld>
+</file>
+
+<file path=ppt/slides/slide36.xml><?xml version="1.0" encoding="utf-8"?>
+<p:sld xmlns:a="http://schemas.openxmlformats.org/drawingml/2006/main" xmlns:r="http://schemas.openxmlformats.org/officeDocument/2006/relationships" xmlns:p="http://schemas.openxmlformats.org/presentationml/2006/main">
+  <p:cSld>
+    <p:spTree>
+      <p:nvGrpSpPr>
+        <p:cNvPr id="1" name=""/>
+        <p:cNvGrpSpPr/>
+        <p:nvPr/>
+      </p:nvGrpSpPr>
+      <p:grpSpPr>
+        <a:xfrm>
+          <a:off x="0" y="0"/>
+          <a:ext cx="0" cy="0"/>
+          <a:chOff x="0" y="0"/>
+          <a:chExt cx="0" cy="0"/>
+        </a:xfrm>
+      </p:grpSpPr>
+      <p:sp>
+        <p:nvSpPr>
+          <p:cNvPr id="2" name="Title 1"/>
+          <p:cNvSpPr>
+            <a:spLocks noGrp="1"/>
+          </p:cNvSpPr>
+          <p:nvPr>
+            <p:ph type="title"/>
+          </p:nvPr>
+        </p:nvSpPr>
+        <p:spPr/>
+        <p:txBody>
+          <a:bodyPr/>
+          <a:lstStyle/>
+          <a:p>
+            <a:r>
+              <a:rPr lang="en-US" dirty="0" smtClean="0"/>
+              <a:t>Classification Support in </a:t>
+            </a:r>
+            <a:r>
+              <a:rPr lang="en-US" dirty="0" err="1" smtClean="0"/>
+              <a:t>MLLib</a:t>
+            </a:r>
+            <a:endParaRPr lang="en-US" dirty="0"/>
+          </a:p>
+        </p:txBody>
+      </p:sp>
+      <p:sp>
+        <p:nvSpPr>
+          <p:cNvPr id="3" name="Content Placeholder 2"/>
+          <p:cNvSpPr>
+            <a:spLocks noGrp="1"/>
+          </p:cNvSpPr>
+          <p:nvPr>
+            <p:ph idx="1"/>
+          </p:nvPr>
+        </p:nvSpPr>
+        <p:spPr/>
+        <p:txBody>
+          <a:bodyPr/>
+          <a:lstStyle/>
+          <a:p>
+            <a:pPr lvl="1"/>
+            <a:r>
+              <a:rPr lang="en-US" dirty="0" smtClean="0"/>
+              <a:t>The following algorithms are well-represented in </a:t>
+            </a:r>
+            <a:r>
+              <a:rPr lang="en-US" dirty="0" err="1" smtClean="0"/>
+              <a:t>MLLib</a:t>
+            </a:r>
+            <a:r>
+              <a:rPr lang="en-US" dirty="0" smtClean="0"/>
+              <a:t>:</a:t>
+            </a:r>
+          </a:p>
+          <a:p>
+            <a:pPr lvl="2"/>
+            <a:r>
+              <a:rPr lang="en-US" dirty="0" smtClean="0"/>
+              <a:t>Linear Methods: SVM, Logistic Regression</a:t>
+            </a:r>
+          </a:p>
+          <a:p>
+            <a:pPr lvl="2"/>
+            <a:r>
+              <a:rPr lang="en-US" dirty="0" smtClean="0"/>
+              <a:t>Decision Trees</a:t>
+            </a:r>
+          </a:p>
+          <a:p>
+            <a:pPr lvl="2"/>
+            <a:r>
+              <a:rPr lang="en-US" dirty="0" smtClean="0"/>
+              <a:t>Ensemble Decision Trees (Random Forests, Gradient Boosted Trees)</a:t>
+            </a:r>
+          </a:p>
+          <a:p>
+            <a:pPr lvl="2"/>
+            <a:r>
+              <a:rPr lang="en-US" dirty="0" smtClean="0"/>
+              <a:t>Naïve </a:t>
+            </a:r>
+            <a:r>
+              <a:rPr lang="en-US" dirty="0" err="1" smtClean="0"/>
+              <a:t>Bayes</a:t>
+            </a:r>
+            <a:endParaRPr lang="en-US" dirty="0" smtClean="0"/>
+          </a:p>
+        </p:txBody>
+      </p:sp>
+      <p:sp>
+        <p:nvSpPr>
+          <p:cNvPr id="4" name="Footer Placeholder 3"/>
+          <p:cNvSpPr>
+            <a:spLocks noGrp="1"/>
+          </p:cNvSpPr>
+          <p:nvPr>
+            <p:ph type="ftr" sz="quarter" idx="11"/>
+          </p:nvPr>
+        </p:nvSpPr>
+        <p:spPr/>
+        <p:txBody>
+          <a:bodyPr/>
+          <a:lstStyle/>
+          <a:p>
+            <a:r>
+              <a:rPr lang="en-US" smtClean="0"/>
+              <a:t>(c) ElephantScale.com 2014</a:t>
+            </a:r>
+            <a:endParaRPr lang="en-US"/>
+          </a:p>
+        </p:txBody>
+      </p:sp>
+      <p:sp>
+        <p:nvSpPr>
+          <p:cNvPr id="5" name="Slide Number Placeholder 4"/>
+          <p:cNvSpPr>
+            <a:spLocks noGrp="1"/>
+          </p:cNvSpPr>
+          <p:nvPr>
+            <p:ph type="sldNum" sz="quarter" idx="12"/>
+          </p:nvPr>
+        </p:nvSpPr>
+        <p:spPr/>
+        <p:txBody>
+          <a:bodyPr/>
+          <a:lstStyle/>
+          <a:p>
+            <a:fld id="{4AD8DDEF-9CD1-B641-ADE5-2BEE59567BE6}" type="slidenum">
+              <a:rPr lang="en-US" smtClean="0"/>
+              <a:pPr/>
+              <a:t>36</a:t>
+            </a:fld>
+            <a:endParaRPr lang="en-US"/>
+          </a:p>
+        </p:txBody>
+      </p:sp>
+    </p:spTree>
+    <p:extLst>
+      <p:ext uri="{BB962C8B-B14F-4D97-AF65-F5344CB8AC3E}">
+        <p14:creationId xmlns:p14="http://schemas.microsoft.com/office/powerpoint/2010/main" xmlns="" val="234258616"/>
+      </p:ext>
+    </p:extLst>
+  </p:cSld>
+  <p:clrMapOvr>
+    <a:masterClrMapping/>
+  </p:clrMapOvr>
+  <p:timing>
+    <p:tnLst>
+      <p:par>
+        <p:cTn id="1" dur="indefinite" restart="never" nodeType="tmRoot"/>
+      </p:par>
+    </p:tnLst>
+  </p:timing>
+</p:sld>
+</file>
+
+<file path=ppt/slides/slide37.xml><?xml version="1.0" encoding="utf-8"?>
+<p:sld xmlns:a="http://schemas.openxmlformats.org/drawingml/2006/main" xmlns:r="http://schemas.openxmlformats.org/officeDocument/2006/relationships" xmlns:p="http://schemas.openxmlformats.org/presentationml/2006/main">
+  <p:cSld>
+    <p:spTree>
+      <p:nvGrpSpPr>
+        <p:cNvPr id="1" name=""/>
+        <p:cNvGrpSpPr/>
+        <p:nvPr/>
+      </p:nvGrpSpPr>
+      <p:grpSpPr>
+        <a:xfrm>
+          <a:off x="0" y="0"/>
+          <a:ext cx="0" cy="0"/>
+          <a:chOff x="0" y="0"/>
+          <a:chExt cx="0" cy="0"/>
+        </a:xfrm>
+      </p:grpSpPr>
+      <p:sp>
+        <p:nvSpPr>
+          <p:cNvPr id="2" name="Title 1"/>
+          <p:cNvSpPr>
+            <a:spLocks noGrp="1"/>
+          </p:cNvSpPr>
+          <p:nvPr>
+            <p:ph type="title"/>
+          </p:nvPr>
+        </p:nvSpPr>
+        <p:spPr/>
+        <p:txBody>
+          <a:bodyPr/>
+          <a:lstStyle/>
+          <a:p>
+            <a:r>
+              <a:rPr lang="en-US" dirty="0" smtClean="0"/>
+              <a:t>Classification Lab</a:t>
+            </a:r>
+            <a:endParaRPr lang="en-US" dirty="0"/>
+          </a:p>
+        </p:txBody>
+      </p:sp>
+      <p:sp>
+        <p:nvSpPr>
+          <p:cNvPr id="3" name="Content Placeholder 2"/>
+          <p:cNvSpPr>
+            <a:spLocks noGrp="1"/>
+          </p:cNvSpPr>
+          <p:nvPr>
+            <p:ph idx="1"/>
+          </p:nvPr>
+        </p:nvSpPr>
+        <p:spPr/>
+        <p:txBody>
+          <a:bodyPr/>
+          <a:lstStyle/>
+          <a:p>
+            <a:r>
+              <a:rPr lang="en-US" dirty="0" smtClean="0"/>
+              <a:t>Use the “churn” dataset for telecom churn prediction</a:t>
+            </a:r>
+          </a:p>
+          <a:p>
+            <a:r>
+              <a:rPr lang="en-US" dirty="0" smtClean="0"/>
+              <a:t>location   : </a:t>
+            </a:r>
+            <a:r>
+              <a:rPr lang="en-US" dirty="0" err="1" smtClean="0"/>
+              <a:t>mllib</a:t>
+            </a:r>
+            <a:r>
+              <a:rPr lang="en-US" dirty="0" smtClean="0"/>
+              <a:t>/</a:t>
+            </a:r>
+            <a:r>
+              <a:rPr lang="en-US" dirty="0" err="1" smtClean="0"/>
+              <a:t>classifation</a:t>
+            </a:r>
+            <a:endParaRPr lang="en-US" dirty="0" smtClean="0"/>
+          </a:p>
+          <a:p>
+            <a:r>
+              <a:rPr lang="en-US" dirty="0" smtClean="0"/>
+              <a:t>Try out the solution line-by-line</a:t>
+            </a:r>
+          </a:p>
+        </p:txBody>
+      </p:sp>
+      <p:sp>
+        <p:nvSpPr>
+          <p:cNvPr id="4" name="Footer Placeholder 3"/>
+          <p:cNvSpPr>
+            <a:spLocks noGrp="1"/>
+          </p:cNvSpPr>
+          <p:nvPr>
+            <p:ph type="ftr" sz="quarter" idx="11"/>
+          </p:nvPr>
+        </p:nvSpPr>
+        <p:spPr/>
+        <p:txBody>
+          <a:bodyPr/>
+          <a:lstStyle/>
+          <a:p>
+            <a:r>
+              <a:rPr lang="en-US" smtClean="0"/>
+              <a:t>(c) ElephantScale.com 2014</a:t>
+            </a:r>
+            <a:endParaRPr lang="en-US"/>
+          </a:p>
+        </p:txBody>
+      </p:sp>
+      <p:sp>
+        <p:nvSpPr>
+          <p:cNvPr id="5" name="Slide Number Placeholder 4"/>
+          <p:cNvSpPr>
+            <a:spLocks noGrp="1"/>
+          </p:cNvSpPr>
+          <p:nvPr>
+            <p:ph type="sldNum" sz="quarter" idx="12"/>
+          </p:nvPr>
+        </p:nvSpPr>
+        <p:spPr/>
+        <p:txBody>
+          <a:bodyPr/>
+          <a:lstStyle/>
+          <a:p>
+            <a:fld id="{4AD8DDEF-9CD1-B641-ADE5-2BEE59567BE6}" type="slidenum">
+              <a:rPr lang="en-US" smtClean="0"/>
+              <a:pPr/>
+              <a:t>37</a:t>
+            </a:fld>
+            <a:endParaRPr lang="en-US"/>
+          </a:p>
+        </p:txBody>
+      </p:sp>
+    </p:spTree>
+    <p:extLst>
+      <p:ext uri="{BB962C8B-B14F-4D97-AF65-F5344CB8AC3E}">
+        <p14:creationId xmlns:p14="http://schemas.microsoft.com/office/powerpoint/2010/main" xmlns="" val="3599210062"/>
+      </p:ext>
+    </p:extLst>
+  </p:cSld>
+  <p:clrMapOvr>
+    <a:masterClrMapping/>
+  </p:clrMapOvr>
+  <p:timing>
+    <p:tnLst>
+      <p:par>
+        <p:cTn id="1" dur="indefinite" restart="never" nodeType="tmRoot"/>
+      </p:par>
+    </p:tnLst>
+  </p:timing>
+</p:sld>
+</file>
+
+<file path=ppt/slides/slide38.xml><?xml version="1.0" encoding="utf-8"?>
+<p:sld xmlns:a="http://schemas.openxmlformats.org/drawingml/2006/main" xmlns:r="http://schemas.openxmlformats.org/officeDocument/2006/relationships" xmlns:p="http://schemas.openxmlformats.org/presentationml/2006/main">
+  <p:cSld>
+    <p:spTree>
+      <p:nvGrpSpPr>
+        <p:cNvPr id="1" name=""/>
+        <p:cNvGrpSpPr/>
+        <p:nvPr/>
+      </p:nvGrpSpPr>
+      <p:grpSpPr>
+        <a:xfrm>
+          <a:off x="0" y="0"/>
+          <a:ext cx="0" cy="0"/>
+          <a:chOff x="0" y="0"/>
+          <a:chExt cx="0" cy="0"/>
+        </a:xfrm>
+      </p:grpSpPr>
+      <p:sp>
+        <p:nvSpPr>
+          <p:cNvPr id="2" name="Title 1"/>
+          <p:cNvSpPr>
+            <a:spLocks noGrp="1"/>
+          </p:cNvSpPr>
+          <p:nvPr>
+            <p:ph type="title"/>
+          </p:nvPr>
+        </p:nvSpPr>
+        <p:spPr/>
+        <p:txBody>
+          <a:bodyPr/>
+          <a:lstStyle/>
+          <a:p>
+            <a:r>
+              <a:rPr lang="en-US" dirty="0" smtClean="0"/>
               <a:t>Thanks! &amp; Questions !</a:t>
             </a:r>
             <a:endParaRPr lang="en-US" dirty="0"/>
@@ -14852,7 +15273,7 @@
 </p:sld>
 </file>
 
-<file path=ppt/slides/slide36.xml><?xml version="1.0" encoding="utf-8"?>
+<file path=ppt/slides/slide39.xml><?xml version="1.0" encoding="utf-8"?>
 <p:sld xmlns:a="http://schemas.openxmlformats.org/drawingml/2006/main" xmlns:r="http://schemas.openxmlformats.org/officeDocument/2006/relationships" xmlns:p="http://schemas.openxmlformats.org/presentationml/2006/main">
   <p:cSld>
     <p:spTree>
@@ -15062,11 +15483,7 @@
             </a:pPr>
             <a:r>
               <a:rPr lang="en-US" dirty="0" smtClean="0"/>
-              <a:t>Any algorithm which improves its performance by access to data.</a:t>
-            </a:r>
-            <a:r>
-              <a:rPr lang="en-US" dirty="0" smtClean="0"/>
-              <a:t> </a:t>
+              <a:t>Any algorithm which improves its performance by access to data. </a:t>
             </a:r>
             <a:endParaRPr lang="en-US" dirty="0"/>
           </a:p>
@@ -15081,7 +15498,6 @@
               <a:rPr lang="en-US" dirty="0" smtClean="0"/>
               <a:t>Also considered a branch of AI (Artificial Intelligence).</a:t>
             </a:r>
-            <a:endParaRPr lang="en-US" dirty="0" smtClean="0"/>
           </a:p>
         </p:txBody>
       </p:sp>
@@ -15237,11 +15653,6 @@
               </a:rPr>
               <a:t>Classification &amp; regression usually supervised.</a:t>
             </a:r>
-            <a:endParaRPr lang="en-US" dirty="0" smtClean="0">
-              <a:solidFill>
-                <a:schemeClr val="tx1"/>
-              </a:solidFill>
-            </a:endParaRPr>
           </a:p>
           <a:p>
             <a:pPr>
@@ -15380,11 +15791,7 @@
           <a:p>
             <a:r>
               <a:rPr lang="en-US" dirty="0" smtClean="0"/>
-              <a:t>Creating </a:t>
-            </a:r>
-            <a:r>
-              <a:rPr lang="en-US" dirty="0" smtClean="0"/>
-              <a:t>Feature Vectors: Feature Extraction</a:t>
+              <a:t>Creating Feature Vectors: Feature Extraction</a:t>
             </a:r>
             <a:endParaRPr lang="en-US" dirty="0"/>
           </a:p>
@@ -15414,59 +15821,29 @@
           <a:p>
             <a:r>
               <a:rPr lang="en-US" dirty="0" smtClean="0"/>
-              <a:t>Machine Learning only </a:t>
-            </a:r>
-            <a:r>
-              <a:rPr lang="en-US" dirty="0" smtClean="0"/>
-              <a:t>works with vectors.  </a:t>
-            </a:r>
-            <a:r>
-              <a:rPr lang="en-US" dirty="0" smtClean="0"/>
-              <a:t>Feature Vectors </a:t>
-            </a:r>
-            <a:r>
-              <a:rPr lang="en-US" dirty="0" smtClean="0"/>
-              <a:t>are an n-dimensional point in space.</a:t>
+              <a:t>Machine Learning only works with vectors.  Feature Vectors are an n-dimensional point in space.</a:t>
             </a:r>
           </a:p>
           <a:p>
             <a:pPr lvl="1"/>
             <a:r>
               <a:rPr lang="en-US" dirty="0" smtClean="0"/>
-              <a:t>All your data’s </a:t>
-            </a:r>
-            <a:r>
-              <a:rPr lang="en-US" dirty="0" smtClean="0"/>
-              <a:t>variables or “features” </a:t>
-            </a:r>
-            <a:r>
-              <a:rPr lang="en-US" dirty="0" smtClean="0"/>
-              <a:t>be collected and put into the vector</a:t>
+              <a:t>Select variables from data</a:t>
             </a:r>
           </a:p>
           <a:p>
             <a:pPr lvl="1"/>
             <a:r>
               <a:rPr lang="en-US" dirty="0" smtClean="0"/>
-              <a:t>Vecto</a:t>
-            </a:r>
-            <a:r>
-              <a:rPr lang="en-US" dirty="0" smtClean="0"/>
-              <a:t>r normalization: scale down high magnitude variables.</a:t>
-            </a:r>
-            <a:endParaRPr lang="en-US" dirty="0" smtClean="0"/>
+              <a:t>Turn data into numbers (doubles).</a:t>
+            </a:r>
           </a:p>
           <a:p>
             <a:pPr lvl="1"/>
             <a:r>
               <a:rPr lang="en-US" dirty="0" smtClean="0"/>
-              <a:t>With much data, this involves selecting factor variables to be the </a:t>
-            </a:r>
-            <a:r>
-              <a:rPr lang="en-US" dirty="0" smtClean="0"/>
-              <a:t>dimensions</a:t>
-            </a:r>
-            <a:endParaRPr lang="en-US" dirty="0" smtClean="0"/>
+              <a:t>“normalize” (scale down) high magnitude data.</a:t>
+            </a:r>
           </a:p>
         </p:txBody>
       </p:sp>
@@ -15601,19 +15978,22 @@
           <a:p>
             <a:r>
               <a:rPr lang="en-US" dirty="0" smtClean="0"/>
-              <a:t>How to create clusters from text?</a:t>
-            </a:r>
-            <a:endParaRPr lang="en-US" dirty="0" smtClean="0"/>
+              <a:t>How to </a:t>
+            </a:r>
+            <a:r>
+              <a:rPr lang="en-US" smtClean="0"/>
+              <a:t>create vectors from </a:t>
+            </a:r>
+            <a:r>
+              <a:rPr lang="en-US" dirty="0" smtClean="0"/>
+              <a:t>text?</a:t>
+            </a:r>
           </a:p>
           <a:p>
             <a:pPr lvl="1"/>
             <a:r>
               <a:rPr lang="en-US" dirty="0" smtClean="0"/>
-              <a:t>TF/IDF</a:t>
-            </a:r>
-            <a:r>
-              <a:rPr lang="en-US" dirty="0" smtClean="0"/>
-              <a:t>: Term Frequency Inverse Document Frequency</a:t>
+              <a:t>TF/IDF: Term Frequency Inverse Document Frequency</a:t>
             </a:r>
           </a:p>
           <a:p>
@@ -15627,13 +16007,8 @@
             <a:pPr lvl="1"/>
             <a:r>
               <a:rPr lang="en-US" dirty="0" smtClean="0"/>
-              <a:t>Each word in the corpus is then a “dimension” – you would have thousands of </a:t>
-            </a:r>
-            <a:r>
-              <a:rPr lang="en-US" dirty="0" smtClean="0"/>
-              <a:t>dimensions.</a:t>
-            </a:r>
-            <a:endParaRPr lang="en-US" dirty="0" smtClean="0"/>
+              <a:t>Each word in the corpus is then a “dimension” – you would have thousands of dimensions.</a:t>
+            </a:r>
           </a:p>
         </p:txBody>
       </p:sp>
@@ -15738,7 +16113,7 @@
           <a:p>
             <a:r>
               <a:rPr lang="en-US" dirty="0" smtClean="0"/>
-              <a:t>Preparing Text</a:t>
+              <a:t>Vectors: Dense versus Sparse</a:t>
             </a:r>
             <a:endParaRPr lang="en-US" dirty="0"/>
           </a:p>
@@ -15754,41 +16129,99 @@
             <p:ph idx="1"/>
           </p:nvPr>
         </p:nvSpPr>
-        <p:spPr/>
-        <p:txBody>
-          <a:bodyPr/>
-          <a:lstStyle/>
-          <a:p>
-            <a:r>
-              <a:rPr lang="en-US" dirty="0" smtClean="0"/>
-              <a:t>Normally, very common words like “the,” “of”, or “and” are removed – these are called stop words.</a:t>
-            </a:r>
-          </a:p>
-          <a:p>
-            <a:r>
-              <a:rPr lang="en-US" dirty="0" smtClean="0"/>
-              <a:t>Words are usually “stemmed” down to their root – we use a package called “snowball” to accomplish this.</a:t>
-            </a:r>
-          </a:p>
-          <a:p>
-            <a:r>
-              <a:rPr lang="en-US" dirty="0" smtClean="0"/>
-              <a:t>We also clean up text, removing numbers, punctuation, and </a:t>
+        <p:spPr>
+          <a:xfrm>
+            <a:off x="498474" y="1981200"/>
+            <a:ext cx="7556313" cy="4442385"/>
+          </a:xfrm>
+        </p:spPr>
+        <p:txBody>
+          <a:bodyPr>
+            <a:normAutofit/>
+          </a:bodyPr>
+          <a:lstStyle/>
+          <a:p>
+            <a:r>
+              <a:rPr lang="en-US" dirty="0" smtClean="0"/>
+              <a:t>Dense Vectors</a:t>
+            </a:r>
+          </a:p>
+          <a:p>
+            <a:pPr lvl="1"/>
+            <a:r>
+              <a:rPr lang="en-US" dirty="0" smtClean="0"/>
+              <a:t>Usually have a nonzero value for each variable</a:t>
+            </a:r>
+          </a:p>
+          <a:p>
+            <a:pPr lvl="1"/>
+            <a:r>
+              <a:rPr lang="en-US" dirty="0" smtClean="0"/>
+              <a:t>The “telecom churn” dataset we use in the labs is a dense dataset.</a:t>
+            </a:r>
+          </a:p>
+          <a:p>
+            <a:pPr lvl="1"/>
+            <a:r>
+              <a:rPr lang="en-US" dirty="0" smtClean="0"/>
+              <a:t>Use </a:t>
             </a:r>
             <a:r>
               <a:rPr lang="en-US" dirty="0" err="1" smtClean="0"/>
-              <a:t>superflous</a:t>
-            </a:r>
-            <a:r>
-              <a:rPr lang="en-US" dirty="0" smtClean="0"/>
-              <a:t> whitespace.</a:t>
-            </a:r>
-          </a:p>
-          <a:p>
-            <a:r>
-              <a:rPr lang="en-US" dirty="0" smtClean="0"/>
-              <a:t>At the end, we have a dictionary of words, and for each document we have each of the terms as a vector dimension.</a:t>
-            </a:r>
+              <a:t>Vectors.dense</a:t>
+            </a:r>
+            <a:endParaRPr lang="en-US" dirty="0" smtClean="0"/>
+          </a:p>
+          <a:p>
+            <a:r>
+              <a:rPr lang="en-US" dirty="0" smtClean="0"/>
+              <a:t>Sparse Vectors</a:t>
+            </a:r>
+          </a:p>
+          <a:p>
+            <a:pPr lvl="1"/>
+            <a:r>
+              <a:rPr lang="en-US" dirty="0" smtClean="0"/>
+              <a:t>Most values are zero (or nonexistent)</a:t>
+            </a:r>
+          </a:p>
+          <a:p>
+            <a:pPr lvl="1"/>
+            <a:r>
+              <a:rPr lang="en-US" dirty="0" smtClean="0"/>
+              <a:t>Text Data yields sparse vectors</a:t>
+            </a:r>
+          </a:p>
+          <a:p>
+            <a:pPr lvl="1"/>
+            <a:r>
+              <a:rPr lang="en-US" dirty="0" smtClean="0"/>
+              <a:t>One-Hot, factor variables lead to sparse vectors</a:t>
+            </a:r>
+          </a:p>
+          <a:p>
+            <a:pPr lvl="1"/>
+            <a:r>
+              <a:rPr lang="en-US" dirty="0" smtClean="0"/>
+              <a:t>Use </a:t>
+            </a:r>
+            <a:r>
+              <a:rPr lang="en-US" dirty="0" err="1" smtClean="0"/>
+              <a:t>Vectors.sparse</a:t>
+            </a:r>
+            <a:endParaRPr lang="en-US" dirty="0" smtClean="0"/>
+          </a:p>
+          <a:p>
+            <a:pPr lvl="1"/>
+            <a:endParaRPr lang="en-US" dirty="0" smtClean="0"/>
+          </a:p>
+          <a:p>
+            <a:pPr lvl="1"/>
+            <a:endParaRPr lang="en-US" dirty="0" smtClean="0"/>
+          </a:p>
+          <a:p>
+            <a:pPr lvl="1"/>
+            <a:endParaRPr lang="en-US" dirty="0" smtClean="0"/>
           </a:p>
         </p:txBody>
       </p:sp>
@@ -15842,7 +16275,7 @@
     </p:spTree>
     <p:extLst>
       <p:ext uri="{BB962C8B-B14F-4D97-AF65-F5344CB8AC3E}">
-        <p14:creationId xmlns:p14="http://schemas.microsoft.com/office/powerpoint/2010/main" xmlns="" val="1413752634"/>
+        <p14:creationId xmlns:p14="http://schemas.microsoft.com/office/powerpoint/2010/main" xmlns="" val="2360138823"/>
       </p:ext>
     </p:extLst>
   </p:cSld>
@@ -15893,7 +16326,7 @@
           <a:p>
             <a:r>
               <a:rPr lang="en-US" dirty="0" smtClean="0"/>
-              <a:t>Next : Clustering</a:t>
+              <a:t>Creating Vectors</a:t>
             </a:r>
             <a:endParaRPr lang="en-US" dirty="0"/>
           </a:p>
@@ -15909,12 +16342,250 @@
             <p:ph idx="1"/>
           </p:nvPr>
         </p:nvSpPr>
-        <p:spPr/>
-        <p:txBody>
-          <a:bodyPr/>
-          <a:lstStyle/>
-          <a:p>
-            <a:endParaRPr lang="en-US"/>
+        <p:spPr>
+          <a:xfrm>
+            <a:off x="498474" y="1981200"/>
+            <a:ext cx="7556313" cy="4442385"/>
+          </a:xfrm>
+        </p:spPr>
+        <p:txBody>
+          <a:bodyPr>
+            <a:normAutofit/>
+          </a:bodyPr>
+          <a:lstStyle/>
+          <a:p>
+            <a:r>
+              <a:rPr lang="en-US" dirty="0" smtClean="0"/>
+              <a:t>Dense </a:t>
+            </a:r>
+            <a:r>
+              <a:rPr lang="en-US" dirty="0" smtClean="0"/>
+              <a:t>Vectors with Labels (for classification)</a:t>
+            </a:r>
+          </a:p>
+          <a:p>
+            <a:pPr>
+              <a:buNone/>
+            </a:pPr>
+            <a:r>
+              <a:rPr lang="en-US" dirty="0" err="1" smtClean="0">
+                <a:latin typeface="Courier New" pitchFamily="49" charset="0"/>
+                <a:cs typeface="Courier New" pitchFamily="49" charset="0"/>
+              </a:rPr>
+              <a:t>val</a:t>
+            </a:r>
+            <a:r>
+              <a:rPr lang="en-US" dirty="0" smtClean="0">
+                <a:latin typeface="Courier New" pitchFamily="49" charset="0"/>
+                <a:cs typeface="Courier New" pitchFamily="49" charset="0"/>
+              </a:rPr>
+              <a:t> </a:t>
+            </a:r>
+            <a:r>
+              <a:rPr lang="en-US" dirty="0" smtClean="0">
+                <a:latin typeface="Courier New" pitchFamily="49" charset="0"/>
+                <a:cs typeface="Courier New" pitchFamily="49" charset="0"/>
+              </a:rPr>
+              <a:t>data = </a:t>
+            </a:r>
+            <a:r>
+              <a:rPr lang="en-US" dirty="0" err="1" smtClean="0">
+                <a:latin typeface="Courier New" pitchFamily="49" charset="0"/>
+                <a:cs typeface="Courier New" pitchFamily="49" charset="0"/>
+              </a:rPr>
+              <a:t>sc.textFile</a:t>
+            </a:r>
+            <a:r>
+              <a:rPr lang="en-US" dirty="0" smtClean="0">
+                <a:latin typeface="Courier New" pitchFamily="49" charset="0"/>
+                <a:cs typeface="Courier New" pitchFamily="49" charset="0"/>
+              </a:rPr>
+              <a:t>(“yourfile.csv")</a:t>
+            </a:r>
+            <a:endParaRPr lang="en-US" dirty="0" smtClean="0">
+              <a:latin typeface="Courier New" pitchFamily="49" charset="0"/>
+              <a:cs typeface="Courier New" pitchFamily="49" charset="0"/>
+            </a:endParaRPr>
+          </a:p>
+          <a:p>
+            <a:pPr>
+              <a:buNone/>
+            </a:pPr>
+            <a:r>
+              <a:rPr lang="en-US" dirty="0" err="1" smtClean="0">
+                <a:latin typeface="Courier New" pitchFamily="49" charset="0"/>
+                <a:cs typeface="Courier New" pitchFamily="49" charset="0"/>
+              </a:rPr>
+              <a:t>val</a:t>
+            </a:r>
+            <a:r>
+              <a:rPr lang="en-US" dirty="0" smtClean="0">
+                <a:latin typeface="Courier New" pitchFamily="49" charset="0"/>
+                <a:cs typeface="Courier New" pitchFamily="49" charset="0"/>
+              </a:rPr>
+              <a:t> </a:t>
+            </a:r>
+            <a:r>
+              <a:rPr lang="en-US" dirty="0" err="1" smtClean="0">
+                <a:latin typeface="Courier New" pitchFamily="49" charset="0"/>
+                <a:cs typeface="Courier New" pitchFamily="49" charset="0"/>
+              </a:rPr>
+              <a:t>splitData</a:t>
+            </a:r>
+            <a:r>
+              <a:rPr lang="en-US" dirty="0" smtClean="0">
+                <a:latin typeface="Courier New" pitchFamily="49" charset="0"/>
+                <a:cs typeface="Courier New" pitchFamily="49" charset="0"/>
+              </a:rPr>
+              <a:t> = data.map { s =&gt;</a:t>
+            </a:r>
+          </a:p>
+          <a:p>
+            <a:pPr>
+              <a:buNone/>
+            </a:pPr>
+            <a:r>
+              <a:rPr lang="en-US" dirty="0" smtClean="0">
+                <a:latin typeface="Courier New" pitchFamily="49" charset="0"/>
+                <a:cs typeface="Courier New" pitchFamily="49" charset="0"/>
+              </a:rPr>
+              <a:t>  </a:t>
+            </a:r>
+            <a:r>
+              <a:rPr lang="en-US" dirty="0" err="1" smtClean="0">
+                <a:latin typeface="Courier New" pitchFamily="49" charset="0"/>
+                <a:cs typeface="Courier New" pitchFamily="49" charset="0"/>
+              </a:rPr>
+              <a:t>val</a:t>
+            </a:r>
+            <a:r>
+              <a:rPr lang="en-US" dirty="0" smtClean="0">
+                <a:latin typeface="Courier New" pitchFamily="49" charset="0"/>
+                <a:cs typeface="Courier New" pitchFamily="49" charset="0"/>
+              </a:rPr>
+              <a:t> parts = </a:t>
+            </a:r>
+            <a:r>
+              <a:rPr lang="en-US" dirty="0" err="1" smtClean="0">
+                <a:latin typeface="Courier New" pitchFamily="49" charset="0"/>
+                <a:cs typeface="Courier New" pitchFamily="49" charset="0"/>
+              </a:rPr>
+              <a:t>s.split</a:t>
+            </a:r>
+            <a:r>
+              <a:rPr lang="en-US" dirty="0" smtClean="0">
+                <a:latin typeface="Courier New" pitchFamily="49" charset="0"/>
+                <a:cs typeface="Courier New" pitchFamily="49" charset="0"/>
+              </a:rPr>
+              <a:t>(',').map</a:t>
+            </a:r>
+            <a:r>
+              <a:rPr lang="en-US" dirty="0" smtClean="0">
+                <a:latin typeface="Courier New" pitchFamily="49" charset="0"/>
+                <a:cs typeface="Courier New" pitchFamily="49" charset="0"/>
+              </a:rPr>
+              <a:t>(_.</a:t>
+            </a:r>
+            <a:r>
+              <a:rPr lang="en-US" dirty="0" err="1" smtClean="0">
+                <a:latin typeface="Courier New" pitchFamily="49" charset="0"/>
+                <a:cs typeface="Courier New" pitchFamily="49" charset="0"/>
+              </a:rPr>
+              <a:t>toDouble</a:t>
+            </a:r>
+            <a:r>
+              <a:rPr lang="en-US" dirty="0" smtClean="0">
+                <a:latin typeface="Courier New" pitchFamily="49" charset="0"/>
+                <a:cs typeface="Courier New" pitchFamily="49" charset="0"/>
+              </a:rPr>
+              <a:t>);</a:t>
+            </a:r>
+          </a:p>
+          <a:p>
+            <a:pPr>
+              <a:buNone/>
+            </a:pPr>
+            <a:r>
+              <a:rPr lang="en-US" dirty="0" smtClean="0">
+                <a:latin typeface="Courier New" pitchFamily="49" charset="0"/>
+                <a:cs typeface="Courier New" pitchFamily="49" charset="0"/>
+              </a:rPr>
+              <a:t>  </a:t>
+            </a:r>
+            <a:r>
+              <a:rPr lang="en-US" dirty="0" err="1" smtClean="0">
+                <a:latin typeface="Courier New" pitchFamily="49" charset="0"/>
+                <a:cs typeface="Courier New" pitchFamily="49" charset="0"/>
+              </a:rPr>
+              <a:t>LabeledPoint</a:t>
+            </a:r>
+            <a:r>
+              <a:rPr lang="en-US" dirty="0" smtClean="0">
+                <a:latin typeface="Courier New" pitchFamily="49" charset="0"/>
+                <a:cs typeface="Courier New" pitchFamily="49" charset="0"/>
+              </a:rPr>
+              <a:t>(if (</a:t>
+            </a:r>
+            <a:r>
+              <a:rPr lang="en-US" dirty="0" smtClean="0">
+                <a:latin typeface="Courier New" pitchFamily="49" charset="0"/>
+                <a:cs typeface="Courier New" pitchFamily="49" charset="0"/>
+              </a:rPr>
+              <a:t>parts(0)==</a:t>
+            </a:r>
+            <a:r>
+              <a:rPr lang="en-US" dirty="0" smtClean="0">
+                <a:latin typeface="Courier New" pitchFamily="49" charset="0"/>
+                <a:cs typeface="Courier New" pitchFamily="49" charset="0"/>
+              </a:rPr>
+              <a:t>1) 1.0 else 0.0, </a:t>
+            </a:r>
+            <a:r>
+              <a:rPr lang="en-US" dirty="0" err="1" smtClean="0">
+                <a:latin typeface="Courier New" pitchFamily="49" charset="0"/>
+                <a:cs typeface="Courier New" pitchFamily="49" charset="0"/>
+              </a:rPr>
+              <a:t>Vectors.dense</a:t>
+            </a:r>
+            <a:r>
+              <a:rPr lang="en-US" dirty="0" smtClean="0">
+                <a:latin typeface="Courier New" pitchFamily="49" charset="0"/>
+                <a:cs typeface="Courier New" pitchFamily="49" charset="0"/>
+              </a:rPr>
+              <a:t>(parts))</a:t>
+            </a:r>
+          </a:p>
+          <a:p>
+            <a:pPr>
+              <a:buNone/>
+            </a:pPr>
+            <a:r>
+              <a:rPr lang="en-US" dirty="0" smtClean="0">
+                <a:latin typeface="Courier New" pitchFamily="49" charset="0"/>
+                <a:cs typeface="Courier New" pitchFamily="49" charset="0"/>
+              </a:rPr>
+              <a:t>}</a:t>
+            </a:r>
+          </a:p>
+          <a:p>
+            <a:pPr>
+              <a:buNone/>
+            </a:pPr>
+            <a:endParaRPr lang="en-US" dirty="0" smtClean="0"/>
+          </a:p>
+          <a:p>
+            <a:pPr>
+              <a:buNone/>
+            </a:pPr>
+            <a:endParaRPr lang="en-US" dirty="0" smtClean="0"/>
+          </a:p>
+          <a:p>
+            <a:pPr lvl="1"/>
+            <a:endParaRPr lang="en-US" dirty="0" smtClean="0"/>
+          </a:p>
+          <a:p>
+            <a:pPr lvl="1"/>
+            <a:endParaRPr lang="en-US" dirty="0" smtClean="0"/>
           </a:p>
         </p:txBody>
       </p:sp>
@@ -15968,13 +16639,20 @@
     </p:spTree>
     <p:extLst>
       <p:ext uri="{BB962C8B-B14F-4D97-AF65-F5344CB8AC3E}">
-        <p14:creationId xmlns:p14="http://schemas.microsoft.com/office/powerpoint/2010/main" xmlns="" val="2260624955"/>
+        <p14:creationId xmlns:p14="http://schemas.microsoft.com/office/powerpoint/2010/main" xmlns="" val="2360138823"/>
       </p:ext>
     </p:extLst>
   </p:cSld>
   <p:clrMapOvr>
     <a:masterClrMapping/>
   </p:clrMapOvr>
+  <p:timing>
+    <p:tnLst>
+      <p:par>
+        <p:cTn id="1" dur="indefinite" restart="never" nodeType="tmRoot"/>
+      </p:par>
+    </p:tnLst>
+  </p:timing>
 </p:sld>
 </file>
 

</xml_diff>